<commit_message>
Organização Repositório (algumas apresentações e planilhas)
</commit_message>
<xml_diff>
--- a/Apresentacoes/GEOsREAIS_v2.pptx
+++ b/Apresentacoes/GEOsREAIS_v2.pptx
@@ -149,7 +149,7 @@
         <p:nvSpPr>
           <p:cNvPr id="2" name="页眉占位符 1"/>
           <p:cNvSpPr>
-            <a:spLocks noGrp="true"/>
+            <a:spLocks noGrp="1"/>
           </p:cNvSpPr>
           <p:nvPr>
             <p:ph type="hdr" sz="quarter"/>
@@ -180,7 +180,7 @@
         <p:nvSpPr>
           <p:cNvPr id="3" name="日期占位符 2"/>
           <p:cNvSpPr>
-            <a:spLocks noGrp="true"/>
+            <a:spLocks noGrp="1"/>
           </p:cNvSpPr>
           <p:nvPr>
             <p:ph type="dt" sz="quarter" idx="1"/>
@@ -214,7 +214,7 @@
         <p:nvSpPr>
           <p:cNvPr id="4" name="页脚占位符 3"/>
           <p:cNvSpPr>
-            <a:spLocks noGrp="true"/>
+            <a:spLocks noGrp="1"/>
           </p:cNvSpPr>
           <p:nvPr>
             <p:ph type="ftr" sz="quarter" idx="2"/>
@@ -245,7 +245,7 @@
         <p:nvSpPr>
           <p:cNvPr id="5" name="灯片编号占位符 4"/>
           <p:cNvSpPr>
-            <a:spLocks noGrp="true"/>
+            <a:spLocks noGrp="1"/>
           </p:cNvSpPr>
           <p:nvPr>
             <p:ph type="sldNum" sz="quarter" idx="3"/>
@@ -307,7 +307,7 @@
         <p:nvSpPr>
           <p:cNvPr id="2" name="页眉占位符 1"/>
           <p:cNvSpPr>
-            <a:spLocks noGrp="true"/>
+            <a:spLocks noGrp="1"/>
           </p:cNvSpPr>
           <p:nvPr>
             <p:ph type="hdr" sz="quarter"/>
@@ -338,7 +338,7 @@
         <p:nvSpPr>
           <p:cNvPr id="3" name="日期占位符 2"/>
           <p:cNvSpPr>
-            <a:spLocks noGrp="true"/>
+            <a:spLocks noGrp="1"/>
           </p:cNvSpPr>
           <p:nvPr>
             <p:ph type="dt" idx="1"/>
@@ -372,7 +372,7 @@
         <p:nvSpPr>
           <p:cNvPr id="4" name="幻灯片图像占位符 3"/>
           <p:cNvSpPr>
-            <a:spLocks noGrp="true" noRot="true" noChangeAspect="true"/>
+            <a:spLocks noGrp="1" noRot="1" noChangeAspect="1"/>
           </p:cNvSpPr>
           <p:nvPr>
             <p:ph type="sldImg" idx="2"/>
@@ -405,7 +405,7 @@
         <p:nvSpPr>
           <p:cNvPr id="5" name="备注占位符 4"/>
           <p:cNvSpPr>
-            <a:spLocks noGrp="true"/>
+            <a:spLocks noGrp="1"/>
           </p:cNvSpPr>
           <p:nvPr>
             <p:ph type="body" sz="quarter" idx="3"/>
@@ -469,7 +469,7 @@
         <p:nvSpPr>
           <p:cNvPr id="6" name="页脚占位符 5"/>
           <p:cNvSpPr>
-            <a:spLocks noGrp="true"/>
+            <a:spLocks noGrp="1"/>
           </p:cNvSpPr>
           <p:nvPr>
             <p:ph type="ftr" sz="quarter" idx="4"/>
@@ -500,7 +500,7 @@
         <p:nvSpPr>
           <p:cNvPr id="7" name="灯片编号占位符 6"/>
           <p:cNvSpPr>
-            <a:spLocks noGrp="true"/>
+            <a:spLocks noGrp="1"/>
           </p:cNvSpPr>
           <p:nvPr>
             <p:ph type="sldNum" sz="quarter" idx="5"/>
@@ -649,7 +649,7 @@
         <p:nvSpPr>
           <p:cNvPr id="2" name="标题 1"/>
           <p:cNvSpPr>
-            <a:spLocks noGrp="true"/>
+            <a:spLocks noGrp="1"/>
           </p:cNvSpPr>
           <p:nvPr>
             <p:ph type="ctrTitle"/>
@@ -698,7 +698,7 @@
         <p:nvSpPr>
           <p:cNvPr id="4" name="日期占位符 3"/>
           <p:cNvSpPr>
-            <a:spLocks noGrp="true"/>
+            <a:spLocks noGrp="1"/>
           </p:cNvSpPr>
           <p:nvPr>
             <p:ph type="dt" sz="half" idx="10"/>
@@ -720,7 +720,7 @@
         <p:nvSpPr>
           <p:cNvPr id="5" name="页脚占位符 4"/>
           <p:cNvSpPr>
-            <a:spLocks noGrp="true"/>
+            <a:spLocks noGrp="1"/>
           </p:cNvSpPr>
           <p:nvPr>
             <p:ph type="ftr" sz="quarter" idx="11"/>
@@ -739,7 +739,7 @@
         <p:nvSpPr>
           <p:cNvPr id="6" name="灯片编号占位符 5"/>
           <p:cNvSpPr>
-            <a:spLocks noGrp="true"/>
+            <a:spLocks noGrp="1"/>
           </p:cNvSpPr>
           <p:nvPr>
             <p:ph type="sldNum" sz="quarter" idx="12"/>
@@ -761,7 +761,7 @@
         <p:nvSpPr>
           <p:cNvPr id="3" name="副标题 2"/>
           <p:cNvSpPr>
-            <a:spLocks noGrp="true"/>
+            <a:spLocks noGrp="1"/>
           </p:cNvSpPr>
           <p:nvPr>
             <p:ph type="subTitle" idx="1"/>
@@ -863,7 +863,7 @@
         <p:nvSpPr>
           <p:cNvPr id="3" name="日期占位符 2"/>
           <p:cNvSpPr>
-            <a:spLocks noGrp="true"/>
+            <a:spLocks noGrp="1"/>
           </p:cNvSpPr>
           <p:nvPr>
             <p:ph type="dt" sz="half" idx="10"/>
@@ -885,7 +885,7 @@
         <p:nvSpPr>
           <p:cNvPr id="4" name="页脚占位符 3"/>
           <p:cNvSpPr>
-            <a:spLocks noGrp="true"/>
+            <a:spLocks noGrp="1"/>
           </p:cNvSpPr>
           <p:nvPr>
             <p:ph type="ftr" sz="quarter" idx="11"/>
@@ -904,7 +904,7 @@
         <p:nvSpPr>
           <p:cNvPr id="5" name="灯片编号占位符 4"/>
           <p:cNvSpPr>
-            <a:spLocks noGrp="true"/>
+            <a:spLocks noGrp="1"/>
           </p:cNvSpPr>
           <p:nvPr>
             <p:ph type="sldNum" sz="quarter" idx="12"/>
@@ -926,7 +926,7 @@
         <p:nvSpPr>
           <p:cNvPr id="7" name="内容占位符 6"/>
           <p:cNvSpPr>
-            <a:spLocks noGrp="true"/>
+            <a:spLocks noGrp="1"/>
           </p:cNvSpPr>
           <p:nvPr>
             <p:ph sz="quarter" idx="13"/>
@@ -1016,7 +1016,7 @@
         <p:nvSpPr>
           <p:cNvPr id="2" name="标题 1"/>
           <p:cNvSpPr>
-            <a:spLocks noGrp="true"/>
+            <a:spLocks noGrp="1"/>
           </p:cNvSpPr>
           <p:nvPr>
             <p:ph type="title"/>
@@ -1029,7 +1029,7 @@
           </a:xfrm>
         </p:spPr>
         <p:txBody>
-          <a:bodyPr anchor="ctr" anchorCtr="false">
+          <a:bodyPr anchor="ctr" anchorCtr="0">
             <a:normAutofit/>
           </a:bodyPr>
           <a:lstStyle>
@@ -1058,7 +1058,7 @@
         <p:nvSpPr>
           <p:cNvPr id="3" name="内容占位符 2"/>
           <p:cNvSpPr>
-            <a:spLocks noGrp="true"/>
+            <a:spLocks noGrp="1"/>
           </p:cNvSpPr>
           <p:nvPr>
             <p:ph idx="1"/>
@@ -1176,7 +1176,7 @@
         <p:nvSpPr>
           <p:cNvPr id="4" name="日期占位符 3"/>
           <p:cNvSpPr>
-            <a:spLocks noGrp="true"/>
+            <a:spLocks noGrp="1"/>
           </p:cNvSpPr>
           <p:nvPr>
             <p:ph type="dt" sz="half" idx="10"/>
@@ -1198,7 +1198,7 @@
         <p:nvSpPr>
           <p:cNvPr id="5" name="页脚占位符 4"/>
           <p:cNvSpPr>
-            <a:spLocks noGrp="true"/>
+            <a:spLocks noGrp="1"/>
           </p:cNvSpPr>
           <p:nvPr>
             <p:ph type="ftr" sz="quarter" idx="11"/>
@@ -1217,7 +1217,7 @@
         <p:nvSpPr>
           <p:cNvPr id="6" name="灯片编号占位符 5"/>
           <p:cNvSpPr>
-            <a:spLocks noGrp="true"/>
+            <a:spLocks noGrp="1"/>
           </p:cNvSpPr>
           <p:nvPr>
             <p:ph type="sldNum" sz="quarter" idx="12"/>
@@ -1264,7 +1264,7 @@
         <p:nvSpPr>
           <p:cNvPr id="2" name="标题 1"/>
           <p:cNvSpPr>
-            <a:spLocks noGrp="true"/>
+            <a:spLocks noGrp="1"/>
           </p:cNvSpPr>
           <p:nvPr>
             <p:ph type="title"/>
@@ -1306,7 +1306,7 @@
         <p:nvSpPr>
           <p:cNvPr id="3" name="文本占位符 2"/>
           <p:cNvSpPr>
-            <a:spLocks noGrp="true"/>
+            <a:spLocks noGrp="1"/>
           </p:cNvSpPr>
           <p:nvPr>
             <p:ph type="body" idx="1"/>
@@ -1430,7 +1430,7 @@
         <p:nvSpPr>
           <p:cNvPr id="4" name="日期占位符 3"/>
           <p:cNvSpPr>
-            <a:spLocks noGrp="true"/>
+            <a:spLocks noGrp="1"/>
           </p:cNvSpPr>
           <p:nvPr>
             <p:ph type="dt" sz="half" idx="10"/>
@@ -1452,7 +1452,7 @@
         <p:nvSpPr>
           <p:cNvPr id="5" name="页脚占位符 4"/>
           <p:cNvSpPr>
-            <a:spLocks noGrp="true"/>
+            <a:spLocks noGrp="1"/>
           </p:cNvSpPr>
           <p:nvPr>
             <p:ph type="ftr" sz="quarter" idx="11"/>
@@ -1471,7 +1471,7 @@
         <p:nvSpPr>
           <p:cNvPr id="6" name="灯片编号占位符 5"/>
           <p:cNvSpPr>
-            <a:spLocks noGrp="true"/>
+            <a:spLocks noGrp="1"/>
           </p:cNvSpPr>
           <p:nvPr>
             <p:ph type="sldNum" sz="quarter" idx="12"/>
@@ -1518,7 +1518,7 @@
         <p:nvSpPr>
           <p:cNvPr id="2" name="标题 1"/>
           <p:cNvSpPr>
-            <a:spLocks noGrp="true"/>
+            <a:spLocks noGrp="1"/>
           </p:cNvSpPr>
           <p:nvPr>
             <p:ph type="title"/>
@@ -1560,7 +1560,7 @@
         <p:nvSpPr>
           <p:cNvPr id="3" name="内容占位符 2"/>
           <p:cNvSpPr>
-            <a:spLocks noGrp="true"/>
+            <a:spLocks noGrp="1"/>
           </p:cNvSpPr>
           <p:nvPr>
             <p:ph sz="half" idx="1"/>
@@ -1693,7 +1693,7 @@
         <p:nvSpPr>
           <p:cNvPr id="4" name="内容占位符 3"/>
           <p:cNvSpPr>
-            <a:spLocks noGrp="true"/>
+            <a:spLocks noGrp="1"/>
           </p:cNvSpPr>
           <p:nvPr>
             <p:ph sz="half" idx="2"/>
@@ -1826,7 +1826,7 @@
         <p:nvSpPr>
           <p:cNvPr id="5" name="日期占位符 4"/>
           <p:cNvSpPr>
-            <a:spLocks noGrp="true"/>
+            <a:spLocks noGrp="1"/>
           </p:cNvSpPr>
           <p:nvPr>
             <p:ph type="dt" sz="half" idx="10"/>
@@ -1848,7 +1848,7 @@
         <p:nvSpPr>
           <p:cNvPr id="6" name="页脚占位符 5"/>
           <p:cNvSpPr>
-            <a:spLocks noGrp="true"/>
+            <a:spLocks noGrp="1"/>
           </p:cNvSpPr>
           <p:nvPr>
             <p:ph type="ftr" sz="quarter" idx="11"/>
@@ -1867,7 +1867,7 @@
         <p:nvSpPr>
           <p:cNvPr id="7" name="灯片编号占位符 6"/>
           <p:cNvSpPr>
-            <a:spLocks noGrp="true"/>
+            <a:spLocks noGrp="1"/>
           </p:cNvSpPr>
           <p:nvPr>
             <p:ph type="sldNum" sz="quarter" idx="12"/>
@@ -1914,7 +1914,7 @@
         <p:nvSpPr>
           <p:cNvPr id="2" name="标题 1"/>
           <p:cNvSpPr>
-            <a:spLocks noGrp="true"/>
+            <a:spLocks noGrp="1"/>
           </p:cNvSpPr>
           <p:nvPr>
             <p:ph type="title"/>
@@ -1942,7 +1942,7 @@
         <p:nvSpPr>
           <p:cNvPr id="3" name="文本占位符 2"/>
           <p:cNvSpPr>
-            <a:spLocks noGrp="true"/>
+            <a:spLocks noGrp="1"/>
           </p:cNvSpPr>
           <p:nvPr>
             <p:ph type="body" idx="1"/>
@@ -2012,7 +2012,7 @@
         <p:nvSpPr>
           <p:cNvPr id="4" name="内容占位符 3"/>
           <p:cNvSpPr>
-            <a:spLocks noGrp="true"/>
+            <a:spLocks noGrp="1"/>
           </p:cNvSpPr>
           <p:nvPr>
             <p:ph sz="half" idx="2"/>
@@ -2077,7 +2077,7 @@
         <p:nvSpPr>
           <p:cNvPr id="5" name="文本占位符 4"/>
           <p:cNvSpPr>
-            <a:spLocks noGrp="true"/>
+            <a:spLocks noGrp="1"/>
           </p:cNvSpPr>
           <p:nvPr>
             <p:ph type="body" sz="quarter" idx="3"/>
@@ -2147,7 +2147,7 @@
         <p:nvSpPr>
           <p:cNvPr id="6" name="内容占位符 5"/>
           <p:cNvSpPr>
-            <a:spLocks noGrp="true"/>
+            <a:spLocks noGrp="1"/>
           </p:cNvSpPr>
           <p:nvPr>
             <p:ph sz="quarter" idx="4"/>
@@ -2212,7 +2212,7 @@
         <p:nvSpPr>
           <p:cNvPr id="7" name="日期占位符 6"/>
           <p:cNvSpPr>
-            <a:spLocks noGrp="true"/>
+            <a:spLocks noGrp="1"/>
           </p:cNvSpPr>
           <p:nvPr>
             <p:ph type="dt" sz="half" idx="10"/>
@@ -2234,7 +2234,7 @@
         <p:nvSpPr>
           <p:cNvPr id="8" name="页脚占位符 7"/>
           <p:cNvSpPr>
-            <a:spLocks noGrp="true"/>
+            <a:spLocks noGrp="1"/>
           </p:cNvSpPr>
           <p:nvPr>
             <p:ph type="ftr" sz="quarter" idx="11"/>
@@ -2253,7 +2253,7 @@
         <p:nvSpPr>
           <p:cNvPr id="9" name="灯片编号占位符 8"/>
           <p:cNvSpPr>
-            <a:spLocks noGrp="true"/>
+            <a:spLocks noGrp="1"/>
           </p:cNvSpPr>
           <p:nvPr>
             <p:ph type="sldNum" sz="quarter" idx="12"/>
@@ -2300,7 +2300,7 @@
         <p:nvSpPr>
           <p:cNvPr id="2" name="标题 1"/>
           <p:cNvSpPr>
-            <a:spLocks noGrp="true"/>
+            <a:spLocks noGrp="1"/>
           </p:cNvSpPr>
           <p:nvPr>
             <p:ph type="title"/>
@@ -2342,7 +2342,7 @@
         <p:nvSpPr>
           <p:cNvPr id="3" name="日期占位符 2"/>
           <p:cNvSpPr>
-            <a:spLocks noGrp="true"/>
+            <a:spLocks noGrp="1"/>
           </p:cNvSpPr>
           <p:nvPr>
             <p:ph type="dt" sz="half" idx="10"/>
@@ -2364,7 +2364,7 @@
         <p:nvSpPr>
           <p:cNvPr id="4" name="页脚占位符 3"/>
           <p:cNvSpPr>
-            <a:spLocks noGrp="true"/>
+            <a:spLocks noGrp="1"/>
           </p:cNvSpPr>
           <p:nvPr>
             <p:ph type="ftr" sz="quarter" idx="11"/>
@@ -2383,7 +2383,7 @@
         <p:nvSpPr>
           <p:cNvPr id="5" name="灯片编号占位符 4"/>
           <p:cNvSpPr>
-            <a:spLocks noGrp="true"/>
+            <a:spLocks noGrp="1"/>
           </p:cNvSpPr>
           <p:nvPr>
             <p:ph type="sldNum" sz="quarter" idx="12"/>
@@ -2430,7 +2430,7 @@
         <p:nvSpPr>
           <p:cNvPr id="2" name="日期占位符 1"/>
           <p:cNvSpPr>
-            <a:spLocks noGrp="true"/>
+            <a:spLocks noGrp="1"/>
           </p:cNvSpPr>
           <p:nvPr>
             <p:ph type="dt" sz="half" idx="10"/>
@@ -2452,7 +2452,7 @@
         <p:nvSpPr>
           <p:cNvPr id="3" name="页脚占位符 2"/>
           <p:cNvSpPr>
-            <a:spLocks noGrp="true"/>
+            <a:spLocks noGrp="1"/>
           </p:cNvSpPr>
           <p:nvPr>
             <p:ph type="ftr" sz="quarter" idx="11"/>
@@ -2471,7 +2471,7 @@
         <p:nvSpPr>
           <p:cNvPr id="4" name="灯片编号占位符 3"/>
           <p:cNvSpPr>
-            <a:spLocks noGrp="true"/>
+            <a:spLocks noGrp="1"/>
           </p:cNvSpPr>
           <p:nvPr>
             <p:ph type="sldNum" sz="quarter" idx="12"/>
@@ -2518,7 +2518,7 @@
         <p:nvSpPr>
           <p:cNvPr id="2" name="标题 1"/>
           <p:cNvSpPr>
-            <a:spLocks noGrp="true"/>
+            <a:spLocks noGrp="1"/>
           </p:cNvSpPr>
           <p:nvPr>
             <p:ph type="title"/>
@@ -2531,7 +2531,7 @@
           </a:xfrm>
         </p:spPr>
         <p:txBody>
-          <a:bodyPr anchor="ctr" anchorCtr="false">
+          <a:bodyPr anchor="ctr" anchorCtr="0">
             <a:normAutofit/>
           </a:bodyPr>
           <a:lstStyle>
@@ -2564,7 +2564,7 @@
         <p:nvSpPr>
           <p:cNvPr id="3" name="图片占位符 2"/>
           <p:cNvSpPr>
-            <a:spLocks noGrp="true" noChangeAspect="true"/>
+            <a:spLocks noGrp="1" noChangeAspect="1"/>
           </p:cNvSpPr>
           <p:nvPr>
             <p:ph type="pic" idx="1"/>
@@ -2625,7 +2625,7 @@
         <p:nvSpPr>
           <p:cNvPr id="4" name="文本占位符 3"/>
           <p:cNvSpPr>
-            <a:spLocks noGrp="true"/>
+            <a:spLocks noGrp="1"/>
           </p:cNvSpPr>
           <p:nvPr>
             <p:ph type="body" sz="half" idx="2"/>
@@ -2696,7 +2696,7 @@
         <p:nvSpPr>
           <p:cNvPr id="5" name="日期占位符 4"/>
           <p:cNvSpPr>
-            <a:spLocks noGrp="true"/>
+            <a:spLocks noGrp="1"/>
           </p:cNvSpPr>
           <p:nvPr>
             <p:ph type="dt" sz="half" idx="10"/>
@@ -2718,7 +2718,7 @@
         <p:nvSpPr>
           <p:cNvPr id="6" name="页脚占位符 5"/>
           <p:cNvSpPr>
-            <a:spLocks noGrp="true"/>
+            <a:spLocks noGrp="1"/>
           </p:cNvSpPr>
           <p:nvPr>
             <p:ph type="ftr" sz="quarter" idx="11"/>
@@ -2737,7 +2737,7 @@
         <p:nvSpPr>
           <p:cNvPr id="7" name="灯片编号占位符 6"/>
           <p:cNvSpPr>
-            <a:spLocks noGrp="true"/>
+            <a:spLocks noGrp="1"/>
           </p:cNvSpPr>
           <p:nvPr>
             <p:ph type="sldNum" sz="quarter" idx="12"/>
@@ -2757,9 +2757,9 @@
       </p:sp>
       <p:cxnSp>
         <p:nvCxnSpPr>
-          <p:cNvPr id="8" name="直接连接符 7" hidden="true"/>
+          <p:cNvPr id="8" name="直接连接符 7" hidden="1"/>
           <p:cNvCxnSpPr/>
-          <p:nvPr userDrawn="true"/>
+          <p:nvPr userDrawn="1"/>
         </p:nvCxnSpPr>
         <p:spPr>
           <a:xfrm>
@@ -2814,7 +2814,7 @@
         <p:nvSpPr>
           <p:cNvPr id="2" name="竖排标题 1"/>
           <p:cNvSpPr>
-            <a:spLocks noGrp="true"/>
+            <a:spLocks noGrp="1"/>
           </p:cNvSpPr>
           <p:nvPr>
             <p:ph type="title" orient="vert"/>
@@ -2848,7 +2848,7 @@
         <p:nvSpPr>
           <p:cNvPr id="3" name="竖排文字占位符 2"/>
           <p:cNvSpPr>
-            <a:spLocks noGrp="true"/>
+            <a:spLocks noGrp="1"/>
           </p:cNvSpPr>
           <p:nvPr>
             <p:ph type="body" orient="vert" idx="1"/>
@@ -2913,7 +2913,7 @@
         <p:nvSpPr>
           <p:cNvPr id="4" name="日期占位符 3"/>
           <p:cNvSpPr>
-            <a:spLocks noGrp="true"/>
+            <a:spLocks noGrp="1"/>
           </p:cNvSpPr>
           <p:nvPr>
             <p:ph type="dt" sz="half" idx="10"/>
@@ -2935,7 +2935,7 @@
         <p:nvSpPr>
           <p:cNvPr id="5" name="页脚占位符 4"/>
           <p:cNvSpPr>
-            <a:spLocks noGrp="true"/>
+            <a:spLocks noGrp="1"/>
           </p:cNvSpPr>
           <p:nvPr>
             <p:ph type="ftr" sz="quarter" idx="11"/>
@@ -2954,7 +2954,7 @@
         <p:nvSpPr>
           <p:cNvPr id="6" name="灯片编号占位符 5"/>
           <p:cNvSpPr>
-            <a:spLocks noGrp="true"/>
+            <a:spLocks noGrp="1"/>
           </p:cNvSpPr>
           <p:nvPr>
             <p:ph type="sldNum" sz="quarter" idx="12"/>
@@ -3009,7 +3009,7 @@
         <p:nvSpPr>
           <p:cNvPr id="2" name="标题占位符 1"/>
           <p:cNvSpPr>
-            <a:spLocks noGrp="true"/>
+            <a:spLocks noGrp="1"/>
           </p:cNvSpPr>
           <p:nvPr>
             <p:ph type="title"/>
@@ -3042,7 +3042,7 @@
         <p:nvSpPr>
           <p:cNvPr id="3" name="文本占位符 2"/>
           <p:cNvSpPr>
-            <a:spLocks noGrp="true"/>
+            <a:spLocks noGrp="1"/>
           </p:cNvSpPr>
           <p:nvPr>
             <p:ph type="body" idx="1"/>
@@ -3112,7 +3112,7 @@
         <p:nvSpPr>
           <p:cNvPr id="4" name="日期占位符 3"/>
           <p:cNvSpPr>
-            <a:spLocks noGrp="true"/>
+            <a:spLocks noGrp="1"/>
           </p:cNvSpPr>
           <p:nvPr>
             <p:ph type="dt" sz="half" idx="2"/>
@@ -3154,7 +3154,7 @@
         <p:nvSpPr>
           <p:cNvPr id="5" name="页脚占位符 4"/>
           <p:cNvSpPr>
-            <a:spLocks noGrp="true"/>
+            <a:spLocks noGrp="1"/>
           </p:cNvSpPr>
           <p:nvPr>
             <p:ph type="ftr" sz="quarter" idx="3"/>
@@ -3193,7 +3193,7 @@
         <p:nvSpPr>
           <p:cNvPr id="6" name="灯片编号占位符 5"/>
           <p:cNvSpPr>
-            <a:spLocks noGrp="true"/>
+            <a:spLocks noGrp="1"/>
           </p:cNvSpPr>
           <p:nvPr>
             <p:ph type="sldNum" sz="quarter" idx="4"/>
@@ -3543,7 +3543,7 @@
         <p:nvPicPr>
           <p:cNvPr id="6" name="Picture 5"/>
           <p:cNvPicPr>
-            <a:picLocks noChangeAspect="true"/>
+            <a:picLocks noChangeAspect="1"/>
           </p:cNvPicPr>
           <p:nvPr/>
         </p:nvPicPr>
@@ -3567,7 +3567,7 @@
         <p:nvPicPr>
           <p:cNvPr id="4" name="Picture 3"/>
           <p:cNvPicPr>
-            <a:picLocks noChangeAspect="true"/>
+            <a:picLocks noChangeAspect="1"/>
           </p:cNvPicPr>
           <p:nvPr/>
         </p:nvPicPr>
@@ -3591,7 +3591,7 @@
         <p:nvSpPr>
           <p:cNvPr id="2" name="Title 1"/>
           <p:cNvSpPr>
-            <a:spLocks noGrp="true"/>
+            <a:spLocks noGrp="1"/>
           </p:cNvSpPr>
           <p:nvPr>
             <p:ph type="ctrTitle"/>
@@ -3628,8 +3628,8 @@
       <p:sp>
         <p:nvSpPr>
           <p:cNvPr id="77" name="Google Shape;77;p1"/>
-          <p:cNvSpPr txBox="true">
-            <a:spLocks noGrp="true"/>
+          <p:cNvSpPr txBox="1">
+            <a:spLocks noGrp="1"/>
           </p:cNvSpPr>
           <p:nvPr/>
         </p:nvSpPr>
@@ -3647,7 +3647,7 @@
           </a:ln>
         </p:spPr>
         <p:txBody>
-          <a:bodyPr wrap="square" lIns="103150" tIns="51575" rIns="103150" bIns="51575" anchor="t" anchorCtr="false">
+          <a:bodyPr wrap="square" lIns="103150" tIns="51575" rIns="103150" bIns="51575" anchor="t" anchorCtr="0">
             <a:noAutofit/>
           </a:bodyPr>
           <a:lstStyle>
@@ -4051,7 +4051,7 @@
         <p:nvPicPr>
           <p:cNvPr id="10" name="Picture 9"/>
           <p:cNvPicPr>
-            <a:picLocks noChangeAspect="true"/>
+            <a:picLocks noChangeAspect="1"/>
           </p:cNvPicPr>
           <p:nvPr/>
         </p:nvPicPr>
@@ -4075,8 +4075,8 @@
       <p:sp>
         <p:nvSpPr>
           <p:cNvPr id="84" name="Google Shape;84;p2"/>
-          <p:cNvSpPr txBox="true">
-            <a:spLocks noGrp="true"/>
+          <p:cNvSpPr txBox="1">
+            <a:spLocks noGrp="1"/>
           </p:cNvSpPr>
           <p:nvPr>
             <p:ph type="title"/>
@@ -4096,7 +4096,7 @@
           </a:ln>
         </p:spPr>
         <p:txBody>
-          <a:bodyPr spcFirstLastPara="1" wrap="square" lIns="103150" tIns="51575" rIns="103150" bIns="51575" anchor="ctr" anchorCtr="false">
+          <a:bodyPr spcFirstLastPara="1" wrap="square" lIns="103150" tIns="51575" rIns="103150" bIns="51575" anchor="ctr" anchorCtr="0">
             <a:noAutofit/>
           </a:bodyPr>
           <a:p>
@@ -4124,8 +4124,8 @@
       <p:sp>
         <p:nvSpPr>
           <p:cNvPr id="3" name="Google Shape;84;p2"/>
-          <p:cNvSpPr txBox="true">
-            <a:spLocks noGrp="true"/>
+          <p:cNvSpPr txBox="1">
+            <a:spLocks noGrp="1"/>
           </p:cNvSpPr>
           <p:nvPr/>
         </p:nvSpPr>
@@ -4143,7 +4143,7 @@
           </a:ln>
         </p:spPr>
         <p:txBody>
-          <a:bodyPr vert="horz" wrap="square" lIns="103150" tIns="51575" rIns="103150" bIns="51575" rtlCol="0" anchor="ctr" anchorCtr="false">
+          <a:bodyPr vert="horz" wrap="square" lIns="103150" tIns="51575" rIns="103150" bIns="51575" rtlCol="0" anchor="ctr" anchorCtr="0">
             <a:noAutofit/>
           </a:bodyPr>
           <a:lstStyle>
@@ -4531,8 +4531,8 @@
       <p:sp>
         <p:nvSpPr>
           <p:cNvPr id="4" name="Google Shape;84;p2"/>
-          <p:cNvSpPr txBox="true">
-            <a:spLocks noGrp="true"/>
+          <p:cNvSpPr txBox="1">
+            <a:spLocks noGrp="1"/>
           </p:cNvSpPr>
           <p:nvPr/>
         </p:nvSpPr>
@@ -4550,7 +4550,7 @@
           </a:ln>
         </p:spPr>
         <p:txBody>
-          <a:bodyPr vert="horz" wrap="square" lIns="103150" tIns="51575" rIns="103150" bIns="51575" rtlCol="0" anchor="ctr" anchorCtr="false">
+          <a:bodyPr vert="horz" wrap="square" lIns="103150" tIns="51575" rIns="103150" bIns="51575" rtlCol="0" anchor="ctr" anchorCtr="0">
             <a:noAutofit/>
           </a:bodyPr>
           <a:lstStyle>
@@ -4615,8 +4615,8 @@
       <p:sp>
         <p:nvSpPr>
           <p:cNvPr id="5" name="Google Shape;84;p2"/>
-          <p:cNvSpPr txBox="true">
-            <a:spLocks noGrp="true"/>
+          <p:cNvSpPr txBox="1">
+            <a:spLocks noGrp="1"/>
           </p:cNvSpPr>
           <p:nvPr/>
         </p:nvSpPr>
@@ -4634,7 +4634,7 @@
           </a:ln>
         </p:spPr>
         <p:txBody>
-          <a:bodyPr vert="horz" wrap="square" lIns="103150" tIns="51575" rIns="103150" bIns="51575" rtlCol="0" anchor="ctr" anchorCtr="false">
+          <a:bodyPr vert="horz" wrap="square" lIns="103150" tIns="51575" rIns="103150" bIns="51575" rtlCol="0" anchor="ctr" anchorCtr="0">
             <a:noAutofit/>
           </a:bodyPr>
           <a:lstStyle>
@@ -5044,7 +5044,7 @@
         <p:nvPicPr>
           <p:cNvPr id="10" name="Picture 9"/>
           <p:cNvPicPr>
-            <a:picLocks noChangeAspect="true"/>
+            <a:picLocks noChangeAspect="1"/>
           </p:cNvPicPr>
           <p:nvPr/>
         </p:nvPicPr>
@@ -5068,8 +5068,8 @@
       <p:sp>
         <p:nvSpPr>
           <p:cNvPr id="84" name="Google Shape;84;p2"/>
-          <p:cNvSpPr txBox="true">
-            <a:spLocks noGrp="true"/>
+          <p:cNvSpPr txBox="1">
+            <a:spLocks noGrp="1"/>
           </p:cNvSpPr>
           <p:nvPr>
             <p:ph type="title"/>
@@ -5089,7 +5089,7 @@
           </a:ln>
         </p:spPr>
         <p:txBody>
-          <a:bodyPr spcFirstLastPara="1" wrap="square" lIns="103150" tIns="51575" rIns="103150" bIns="51575" anchor="ctr" anchorCtr="false">
+          <a:bodyPr spcFirstLastPara="1" wrap="square" lIns="103150" tIns="51575" rIns="103150" bIns="51575" anchor="ctr" anchorCtr="0">
             <a:noAutofit/>
           </a:bodyPr>
           <a:p>
@@ -5117,8 +5117,8 @@
       <p:sp>
         <p:nvSpPr>
           <p:cNvPr id="3" name="Google Shape;84;p2"/>
-          <p:cNvSpPr txBox="true">
-            <a:spLocks noGrp="true"/>
+          <p:cNvSpPr txBox="1">
+            <a:spLocks noGrp="1"/>
           </p:cNvSpPr>
           <p:nvPr/>
         </p:nvSpPr>
@@ -5136,7 +5136,7 @@
           </a:ln>
         </p:spPr>
         <p:txBody>
-          <a:bodyPr vert="horz" wrap="square" lIns="103150" tIns="51575" rIns="103150" bIns="51575" rtlCol="0" anchor="ctr" anchorCtr="false">
+          <a:bodyPr vert="horz" wrap="square" lIns="103150" tIns="51575" rIns="103150" bIns="51575" rtlCol="0" anchor="ctr" anchorCtr="0">
             <a:noAutofit/>
           </a:bodyPr>
           <a:lstStyle>
@@ -5557,8 +5557,8 @@
       <p:sp>
         <p:nvSpPr>
           <p:cNvPr id="2" name="Google Shape;84;p2"/>
-          <p:cNvSpPr txBox="true">
-            <a:spLocks noGrp="true"/>
+          <p:cNvSpPr txBox="1">
+            <a:spLocks noGrp="1"/>
           </p:cNvSpPr>
           <p:nvPr/>
         </p:nvSpPr>
@@ -5576,7 +5576,7 @@
           </a:ln>
         </p:spPr>
         <p:txBody>
-          <a:bodyPr vert="horz" wrap="square" lIns="103150" tIns="51575" rIns="103150" bIns="51575" rtlCol="0" anchor="ctr" anchorCtr="false">
+          <a:bodyPr vert="horz" wrap="square" lIns="103150" tIns="51575" rIns="103150" bIns="51575" rtlCol="0" anchor="ctr" anchorCtr="0">
             <a:noAutofit/>
           </a:bodyPr>
           <a:lstStyle>
@@ -5967,8 +5967,8 @@
       <p:sp>
         <p:nvSpPr>
           <p:cNvPr id="4" name="Google Shape;84;p2"/>
-          <p:cNvSpPr txBox="true">
-            <a:spLocks noGrp="true"/>
+          <p:cNvSpPr txBox="1">
+            <a:spLocks noGrp="1"/>
           </p:cNvSpPr>
           <p:nvPr/>
         </p:nvSpPr>
@@ -5986,7 +5986,7 @@
           </a:ln>
         </p:spPr>
         <p:txBody>
-          <a:bodyPr vert="horz" wrap="square" lIns="103150" tIns="51575" rIns="103150" bIns="51575" rtlCol="0" anchor="ctr" anchorCtr="false">
+          <a:bodyPr vert="horz" wrap="square" lIns="103150" tIns="51575" rIns="103150" bIns="51575" rtlCol="0" anchor="ctr" anchorCtr="0">
             <a:noAutofit/>
           </a:bodyPr>
           <a:lstStyle>
@@ -6070,7 +6070,7 @@
         <p:nvPicPr>
           <p:cNvPr id="10" name="Picture 9"/>
           <p:cNvPicPr>
-            <a:picLocks noChangeAspect="true"/>
+            <a:picLocks noChangeAspect="1"/>
           </p:cNvPicPr>
           <p:nvPr/>
         </p:nvPicPr>
@@ -6094,8 +6094,8 @@
       <p:sp>
         <p:nvSpPr>
           <p:cNvPr id="84" name="Google Shape;84;p2"/>
-          <p:cNvSpPr txBox="true">
-            <a:spLocks noGrp="true"/>
+          <p:cNvSpPr txBox="1">
+            <a:spLocks noGrp="1"/>
           </p:cNvSpPr>
           <p:nvPr>
             <p:ph type="title"/>
@@ -6115,7 +6115,7 @@
           </a:ln>
         </p:spPr>
         <p:txBody>
-          <a:bodyPr spcFirstLastPara="1" wrap="square" lIns="103150" tIns="51575" rIns="103150" bIns="51575" anchor="ctr" anchorCtr="false">
+          <a:bodyPr spcFirstLastPara="1" wrap="square" lIns="103150" tIns="51575" rIns="103150" bIns="51575" anchor="ctr" anchorCtr="0">
             <a:noAutofit/>
           </a:bodyPr>
           <a:p>
@@ -6143,8 +6143,8 @@
       <p:sp>
         <p:nvSpPr>
           <p:cNvPr id="3" name="Google Shape;84;p2"/>
-          <p:cNvSpPr txBox="true">
-            <a:spLocks noGrp="true"/>
+          <p:cNvSpPr txBox="1">
+            <a:spLocks noGrp="1"/>
           </p:cNvSpPr>
           <p:nvPr/>
         </p:nvSpPr>
@@ -6162,7 +6162,7 @@
           </a:ln>
         </p:spPr>
         <p:txBody>
-          <a:bodyPr vert="horz" wrap="square" lIns="103150" tIns="51575" rIns="103150" bIns="51575" rtlCol="0" anchor="ctr" anchorCtr="false">
+          <a:bodyPr vert="horz" wrap="square" lIns="103150" tIns="51575" rIns="103150" bIns="51575" rtlCol="0" anchor="ctr" anchorCtr="0">
             <a:noAutofit/>
           </a:bodyPr>
           <a:lstStyle>
@@ -6261,190 +6261,9 @@
       <p:grpSpPr/>
       <p:pic>
         <p:nvPicPr>
-          <p:cNvPr id="26" name="Picture 1"/>
-          <p:cNvPicPr>
-            <a:picLocks noChangeAspect="true"/>
-          </p:cNvPicPr>
-          <p:nvPr/>
-        </p:nvPicPr>
-        <p:blipFill>
-          <a:blip r:embed="rId1"/>
-          <a:stretch>
-            <a:fillRect/>
-          </a:stretch>
-        </p:blipFill>
-        <p:spPr>
-          <a:xfrm>
-            <a:off x="897255" y="3973830"/>
-            <a:ext cx="4099560" cy="1604010"/>
-          </a:xfrm>
-          <a:prstGeom prst="rect">
-            <a:avLst/>
-          </a:prstGeom>
-          <a:noFill/>
-          <a:ln>
-            <a:noFill/>
-          </a:ln>
-        </p:spPr>
-      </p:pic>
-      <p:pic>
-        <p:nvPicPr>
           <p:cNvPr id="10" name="Picture 9"/>
           <p:cNvPicPr>
-            <a:picLocks noChangeAspect="true"/>
-          </p:cNvPicPr>
-          <p:nvPr/>
-        </p:nvPicPr>
-        <p:blipFill>
-          <a:blip r:embed="rId2"/>
-          <a:srcRect b="5928"/>
-          <a:stretch>
-            <a:fillRect/>
-          </a:stretch>
-        </p:blipFill>
-        <p:spPr>
-          <a:xfrm>
-            <a:off x="635" y="-19685"/>
-            <a:ext cx="723900" cy="6872605"/>
-          </a:xfrm>
-          <a:prstGeom prst="rect">
-            <a:avLst/>
-          </a:prstGeom>
-        </p:spPr>
-      </p:pic>
-      <p:sp>
-        <p:nvSpPr>
-          <p:cNvPr id="84" name="Google Shape;84;p2"/>
-          <p:cNvSpPr txBox="true">
-            <a:spLocks noGrp="true"/>
-          </p:cNvSpPr>
-          <p:nvPr>
-            <p:ph type="title"/>
-          </p:nvPr>
-        </p:nvSpPr>
-        <p:spPr>
-          <a:xfrm>
-            <a:off x="1210945" y="371475"/>
-            <a:ext cx="3044190" cy="2595245"/>
-          </a:xfrm>
-          <a:prstGeom prst="rect">
-            <a:avLst/>
-          </a:prstGeom>
-          <a:noFill/>
-          <a:ln>
-            <a:noFill/>
-          </a:ln>
-        </p:spPr>
-        <p:txBody>
-          <a:bodyPr spcFirstLastPara="1" wrap="square" lIns="103150" tIns="51575" rIns="103150" bIns="51575" anchor="ctr" anchorCtr="false">
-            <a:noAutofit/>
-          </a:bodyPr>
-          <a:p>
-            <a:pPr algn="ctr"/>
-            <a:r>
-              <a:rPr lang="pt-PT" altLang="pt-BR" sz="2800">
-                <a:latin typeface="Arial Black" panose="020B0A04020102020204" charset="0"/>
-                <a:cs typeface="Arial Black" panose="020B0A04020102020204" charset="0"/>
-              </a:rPr>
-              <a:t>GEO </a:t>
-            </a:r>
-            <a:br>
-              <a:rPr lang="pt-PT" altLang="pt-BR" sz="2800">
-                <a:latin typeface="Arial Black" panose="020B0A04020102020204" charset="0"/>
-                <a:cs typeface="Arial Black" panose="020B0A04020102020204" charset="0"/>
-              </a:rPr>
-            </a:br>
-            <a:r>
-              <a:rPr lang="pt-PT" altLang="pt-BR" sz="2800">
-                <a:latin typeface="Arial Black" panose="020B0A04020102020204" charset="0"/>
-                <a:cs typeface="Arial Black" panose="020B0A04020102020204" charset="0"/>
-              </a:rPr>
-              <a:t>e </a:t>
-            </a:r>
-            <a:br>
-              <a:rPr lang="pt-PT" altLang="pt-BR" sz="2800">
-                <a:latin typeface="Arial Black" panose="020B0A04020102020204" charset="0"/>
-                <a:cs typeface="Arial Black" panose="020B0A04020102020204" charset="0"/>
-              </a:rPr>
-            </a:br>
-            <a:r>
-              <a:rPr lang="pt-PT" altLang="pt-BR" sz="2800">
-                <a:latin typeface="Arial Black" panose="020B0A04020102020204" charset="0"/>
-                <a:cs typeface="Arial Black" panose="020B0A04020102020204" charset="0"/>
-              </a:rPr>
-              <a:t>GEO</a:t>
-            </a:r>
-            <a:r>
-              <a:rPr lang="pt-PT" altLang="pt-BR" sz="2800" baseline="-25000">
-                <a:solidFill>
-                  <a:schemeClr val="tx1"/>
-                </a:solidFill>
-                <a:uFillTx/>
-                <a:latin typeface="Arial Black" panose="020B0A04020102020204" charset="0"/>
-                <a:cs typeface="Arial Black" panose="020B0A04020102020204" charset="0"/>
-              </a:rPr>
-              <a:t>var</a:t>
-            </a:r>
-            <a:endParaRPr lang="pt-PT" altLang="pt-BR" sz="2800" baseline="-25000">
-              <a:solidFill>
-                <a:schemeClr val="tx1"/>
-              </a:solidFill>
-              <a:uFillTx/>
-              <a:latin typeface="Arial Black" panose="020B0A04020102020204" charset="0"/>
-              <a:ea typeface="Arial" panose="020B0604020202020204"/>
-              <a:cs typeface="Arial Black" panose="020B0A04020102020204" charset="0"/>
-              <a:sym typeface="Arial" panose="020B0604020202020204"/>
-            </a:endParaRPr>
-          </a:p>
-        </p:txBody>
-      </p:sp>
-      <p:pic>
-        <p:nvPicPr>
-          <p:cNvPr id="2" name="Picture 1"/>
-          <p:cNvPicPr>
-            <a:picLocks noChangeAspect="true"/>
-          </p:cNvPicPr>
-          <p:nvPr/>
-        </p:nvPicPr>
-        <p:blipFill>
-          <a:blip r:embed="rId3"/>
-          <a:stretch>
-            <a:fillRect/>
-          </a:stretch>
-        </p:blipFill>
-        <p:spPr>
-          <a:xfrm>
-            <a:off x="5292725" y="76835"/>
-            <a:ext cx="5385435" cy="6704965"/>
-          </a:xfrm>
-          <a:prstGeom prst="rect">
-            <a:avLst/>
-          </a:prstGeom>
-        </p:spPr>
-      </p:pic>
-    </p:spTree>
-  </p:cSld>
-  <p:clrMapOvr>
-    <a:masterClrMapping/>
-  </p:clrMapOvr>
-</p:sld>
-</file>
-
-<file path=ppt/slides/slide4.xml><?xml version="1.0" encoding="utf-8"?>
-<p:sld xmlns:a="http://schemas.openxmlformats.org/drawingml/2006/main" xmlns:r="http://schemas.openxmlformats.org/officeDocument/2006/relationships" xmlns:p="http://schemas.openxmlformats.org/presentationml/2006/main">
-  <p:cSld>
-    <p:spTree>
-      <p:nvGrpSpPr>
-        <p:cNvPr id="1" name=""/>
-        <p:cNvGrpSpPr/>
-        <p:nvPr/>
-      </p:nvGrpSpPr>
-      <p:grpSpPr/>
-      <p:pic>
-        <p:nvPicPr>
-          <p:cNvPr id="10" name="Picture 9"/>
-          <p:cNvPicPr>
-            <a:picLocks noChangeAspect="true"/>
+            <a:picLocks noChangeAspect="1"/>
           </p:cNvPicPr>
           <p:nvPr/>
         </p:nvPicPr>
@@ -6468,8 +6287,1952 @@
       <p:sp>
         <p:nvSpPr>
           <p:cNvPr id="84" name="Google Shape;84;p2"/>
-          <p:cNvSpPr txBox="true">
-            <a:spLocks noGrp="true"/>
+          <p:cNvSpPr txBox="1">
+            <a:spLocks noGrp="1"/>
+          </p:cNvSpPr>
+          <p:nvPr>
+            <p:ph type="title"/>
+          </p:nvPr>
+        </p:nvSpPr>
+        <p:spPr>
+          <a:xfrm>
+            <a:off x="1210945" y="371475"/>
+            <a:ext cx="3044190" cy="2595245"/>
+          </a:xfrm>
+          <a:prstGeom prst="rect">
+            <a:avLst/>
+          </a:prstGeom>
+          <a:noFill/>
+          <a:ln>
+            <a:noFill/>
+          </a:ln>
+        </p:spPr>
+        <p:txBody>
+          <a:bodyPr spcFirstLastPara="1" wrap="square" lIns="103150" tIns="51575" rIns="103150" bIns="51575" anchor="ctr" anchorCtr="0">
+            <a:noAutofit/>
+          </a:bodyPr>
+          <a:p>
+            <a:pPr algn="ctr"/>
+            <a:r>
+              <a:rPr lang="pt-PT" altLang="pt-BR" sz="2800">
+                <a:latin typeface="Arial Black" panose="020B0A04020102020204" charset="0"/>
+                <a:cs typeface="Arial Black" panose="020B0A04020102020204" charset="0"/>
+              </a:rPr>
+              <a:t>GEO </a:t>
+            </a:r>
+            <a:br>
+              <a:rPr lang="pt-PT" altLang="pt-BR" sz="2800">
+                <a:latin typeface="Arial Black" panose="020B0A04020102020204" charset="0"/>
+                <a:cs typeface="Arial Black" panose="020B0A04020102020204" charset="0"/>
+              </a:rPr>
+            </a:br>
+            <a:r>
+              <a:rPr lang="pt-PT" altLang="pt-BR" sz="2800">
+                <a:latin typeface="Arial Black" panose="020B0A04020102020204" charset="0"/>
+                <a:cs typeface="Arial Black" panose="020B0A04020102020204" charset="0"/>
+              </a:rPr>
+              <a:t>e </a:t>
+            </a:r>
+            <a:br>
+              <a:rPr lang="pt-PT" altLang="pt-BR" sz="2800">
+                <a:latin typeface="Arial Black" panose="020B0A04020102020204" charset="0"/>
+                <a:cs typeface="Arial Black" panose="020B0A04020102020204" charset="0"/>
+              </a:rPr>
+            </a:br>
+            <a:r>
+              <a:rPr lang="pt-PT" altLang="pt-BR" sz="2800">
+                <a:latin typeface="Arial Black" panose="020B0A04020102020204" charset="0"/>
+                <a:cs typeface="Arial Black" panose="020B0A04020102020204" charset="0"/>
+              </a:rPr>
+              <a:t>GEO</a:t>
+            </a:r>
+            <a:r>
+              <a:rPr lang="pt-PT" altLang="pt-BR" sz="2800" baseline="-25000">
+                <a:solidFill>
+                  <a:schemeClr val="tx1"/>
+                </a:solidFill>
+                <a:uFillTx/>
+                <a:latin typeface="Arial Black" panose="020B0A04020102020204" charset="0"/>
+                <a:cs typeface="Arial Black" panose="020B0A04020102020204" charset="0"/>
+              </a:rPr>
+              <a:t>var</a:t>
+            </a:r>
+            <a:endParaRPr lang="pt-PT" altLang="pt-BR" sz="2800" baseline="-25000">
+              <a:solidFill>
+                <a:schemeClr val="tx1"/>
+              </a:solidFill>
+              <a:uFillTx/>
+              <a:latin typeface="Arial Black" panose="020B0A04020102020204" charset="0"/>
+              <a:ea typeface="Arial" panose="020B0604020202020204"/>
+              <a:cs typeface="Arial Black" panose="020B0A04020102020204" charset="0"/>
+              <a:sym typeface="Arial" panose="020B0604020202020204"/>
+            </a:endParaRPr>
+          </a:p>
+        </p:txBody>
+      </p:sp>
+      <p:pic>
+        <p:nvPicPr>
+          <p:cNvPr id="2" name="Picture 1"/>
+          <p:cNvPicPr>
+            <a:picLocks noChangeAspect="1"/>
+          </p:cNvPicPr>
+          <p:nvPr/>
+        </p:nvPicPr>
+        <p:blipFill>
+          <a:blip r:embed="rId2"/>
+          <a:stretch>
+            <a:fillRect/>
+          </a:stretch>
+        </p:blipFill>
+        <p:spPr>
+          <a:xfrm>
+            <a:off x="5292725" y="76835"/>
+            <a:ext cx="5385435" cy="6704965"/>
+          </a:xfrm>
+          <a:prstGeom prst="rect">
+            <a:avLst/>
+          </a:prstGeom>
+        </p:spPr>
+      </p:pic>
+      <p:grpSp>
+        <p:nvGrpSpPr>
+          <p:cNvPr id="205" name="Group 204"/>
+          <p:cNvGrpSpPr/>
+          <p:nvPr/>
+        </p:nvGrpSpPr>
+        <p:grpSpPr>
+          <a:xfrm>
+            <a:off x="850265" y="3990975"/>
+            <a:ext cx="4096385" cy="1605280"/>
+            <a:chOff x="6628" y="3708"/>
+            <a:chExt cx="6451" cy="2528"/>
+          </a:xfrm>
+        </p:grpSpPr>
+        <p:grpSp>
+          <p:nvGrpSpPr>
+            <p:cNvPr id="27" name="Group 26"/>
+            <p:cNvGrpSpPr/>
+            <p:nvPr/>
+          </p:nvGrpSpPr>
+          <p:grpSpPr>
+            <a:xfrm>
+              <a:off x="7548" y="5071"/>
+              <a:ext cx="460" cy="580"/>
+              <a:chOff x="3330" y="4997"/>
+              <a:chExt cx="460" cy="580"/>
+            </a:xfrm>
+          </p:grpSpPr>
+          <p:sp>
+            <p:nvSpPr>
+              <p:cNvPr id="12" name="Text Box 11"/>
+              <p:cNvSpPr txBox="1"/>
+              <p:nvPr/>
+            </p:nvSpPr>
+            <p:spPr>
+              <a:xfrm>
+                <a:off x="3330" y="4997"/>
+                <a:ext cx="461" cy="580"/>
+              </a:xfrm>
+              <a:prstGeom prst="rect">
+                <a:avLst/>
+              </a:prstGeom>
+              <a:noFill/>
+            </p:spPr>
+            <p:txBody>
+              <a:bodyPr wrap="square" rtlCol="0">
+                <a:spAutoFit/>
+              </a:bodyPr>
+              <a:p>
+                <a:pPr fontAlgn="auto"/>
+                <a:r>
+                  <a:rPr lang="pt-PT" altLang="en-US"/>
+                  <a:t>1</a:t>
+                </a:r>
+                <a:endParaRPr lang="pt-PT" altLang="en-US"/>
+              </a:p>
+            </p:txBody>
+          </p:sp>
+          <p:sp>
+            <p:nvSpPr>
+              <p:cNvPr id="4" name="Rectangle 3"/>
+              <p:cNvSpPr/>
+              <p:nvPr/>
+            </p:nvSpPr>
+            <p:spPr>
+              <a:xfrm>
+                <a:off x="3330" y="4997"/>
+                <a:ext cx="460" cy="580"/>
+              </a:xfrm>
+              <a:prstGeom prst="rect">
+                <a:avLst/>
+              </a:prstGeom>
+              <a:noFill/>
+              <a:ln>
+                <a:solidFill>
+                  <a:schemeClr val="tx1"/>
+                </a:solidFill>
+              </a:ln>
+              <a:extLst>
+                <a:ext uri="{909E8E84-426E-40DD-AFC4-6F175D3DCCD1}">
+                  <a14:hiddenFill xmlns:a14="http://schemas.microsoft.com/office/drawing/2010/main">
+                    <a:solidFill>
+                      <a:schemeClr val="accent1"/>
+                    </a:solidFill>
+                  </a14:hiddenFill>
+                </a:ext>
+              </a:extLst>
+            </p:spPr>
+            <p:style>
+              <a:lnRef idx="2">
+                <a:schemeClr val="accent1">
+                  <a:shade val="50000"/>
+                </a:schemeClr>
+              </a:lnRef>
+              <a:fillRef idx="1">
+                <a:schemeClr val="accent1"/>
+              </a:fillRef>
+              <a:effectRef idx="0">
+                <a:schemeClr val="accent1"/>
+              </a:effectRef>
+              <a:fontRef idx="minor">
+                <a:schemeClr val="lt1"/>
+              </a:fontRef>
+            </p:style>
+            <p:txBody>
+              <a:bodyPr rtlCol="0" anchor="ctr"/>
+              <a:p>
+                <a:pPr algn="ctr"/>
+                <a:endParaRPr lang="en-US"/>
+              </a:p>
+            </p:txBody>
+          </p:sp>
+        </p:grpSp>
+        <p:grpSp>
+          <p:nvGrpSpPr>
+            <p:cNvPr id="30" name="Group 29"/>
+            <p:cNvGrpSpPr/>
+            <p:nvPr/>
+          </p:nvGrpSpPr>
+          <p:grpSpPr>
+            <a:xfrm>
+              <a:off x="8474" y="5071"/>
+              <a:ext cx="461" cy="580"/>
+              <a:chOff x="3330" y="4997"/>
+              <a:chExt cx="461" cy="580"/>
+            </a:xfrm>
+          </p:grpSpPr>
+          <p:sp>
+            <p:nvSpPr>
+              <p:cNvPr id="31" name="Text Box 30"/>
+              <p:cNvSpPr txBox="1"/>
+              <p:nvPr/>
+            </p:nvSpPr>
+            <p:spPr>
+              <a:xfrm>
+                <a:off x="3330" y="4997"/>
+                <a:ext cx="461" cy="580"/>
+              </a:xfrm>
+              <a:prstGeom prst="rect">
+                <a:avLst/>
+              </a:prstGeom>
+              <a:noFill/>
+            </p:spPr>
+            <p:txBody>
+              <a:bodyPr wrap="square" rtlCol="0">
+                <a:spAutoFit/>
+              </a:bodyPr>
+              <a:p>
+                <a:pPr fontAlgn="auto"/>
+                <a:r>
+                  <a:rPr lang="pt-PT" altLang="en-US"/>
+                  <a:t>0</a:t>
+                </a:r>
+                <a:endParaRPr lang="pt-PT" altLang="en-US"/>
+              </a:p>
+            </p:txBody>
+          </p:sp>
+          <p:sp>
+            <p:nvSpPr>
+              <p:cNvPr id="32" name="Rectangle 31"/>
+              <p:cNvSpPr/>
+              <p:nvPr/>
+            </p:nvSpPr>
+            <p:spPr>
+              <a:xfrm>
+                <a:off x="3330" y="4997"/>
+                <a:ext cx="460" cy="580"/>
+              </a:xfrm>
+              <a:prstGeom prst="rect">
+                <a:avLst/>
+              </a:prstGeom>
+              <a:noFill/>
+              <a:ln>
+                <a:solidFill>
+                  <a:schemeClr val="tx1"/>
+                </a:solidFill>
+              </a:ln>
+              <a:extLst>
+                <a:ext uri="{909E8E84-426E-40DD-AFC4-6F175D3DCCD1}">
+                  <a14:hiddenFill xmlns:a14="http://schemas.microsoft.com/office/drawing/2010/main">
+                    <a:solidFill>
+                      <a:schemeClr val="accent1"/>
+                    </a:solidFill>
+                  </a14:hiddenFill>
+                </a:ext>
+              </a:extLst>
+            </p:spPr>
+            <p:style>
+              <a:lnRef idx="2">
+                <a:schemeClr val="accent1">
+                  <a:shade val="50000"/>
+                </a:schemeClr>
+              </a:lnRef>
+              <a:fillRef idx="1">
+                <a:schemeClr val="accent1"/>
+              </a:fillRef>
+              <a:effectRef idx="0">
+                <a:schemeClr val="accent1"/>
+              </a:effectRef>
+              <a:fontRef idx="minor">
+                <a:schemeClr val="lt1"/>
+              </a:fontRef>
+            </p:style>
+            <p:txBody>
+              <a:bodyPr rtlCol="0" anchor="ctr"/>
+              <a:p>
+                <a:pPr algn="ctr"/>
+                <a:endParaRPr lang="en-US"/>
+              </a:p>
+            </p:txBody>
+          </p:sp>
+        </p:grpSp>
+        <p:grpSp>
+          <p:nvGrpSpPr>
+            <p:cNvPr id="37" name="Group 36"/>
+            <p:cNvGrpSpPr/>
+            <p:nvPr/>
+          </p:nvGrpSpPr>
+          <p:grpSpPr>
+            <a:xfrm>
+              <a:off x="6628" y="5071"/>
+              <a:ext cx="460" cy="580"/>
+              <a:chOff x="3330" y="4997"/>
+              <a:chExt cx="460" cy="580"/>
+            </a:xfrm>
+          </p:grpSpPr>
+          <p:sp>
+            <p:nvSpPr>
+              <p:cNvPr id="38" name="Text Box 37"/>
+              <p:cNvSpPr txBox="1"/>
+              <p:nvPr/>
+            </p:nvSpPr>
+            <p:spPr>
+              <a:xfrm>
+                <a:off x="3330" y="4997"/>
+                <a:ext cx="461" cy="580"/>
+              </a:xfrm>
+              <a:prstGeom prst="rect">
+                <a:avLst/>
+              </a:prstGeom>
+              <a:noFill/>
+            </p:spPr>
+            <p:txBody>
+              <a:bodyPr wrap="square" rtlCol="0">
+                <a:spAutoFit/>
+              </a:bodyPr>
+              <a:p>
+                <a:pPr fontAlgn="auto"/>
+                <a:r>
+                  <a:rPr lang="pt-PT" altLang="en-US"/>
+                  <a:t>1</a:t>
+                </a:r>
+                <a:endParaRPr lang="pt-PT" altLang="en-US"/>
+              </a:p>
+            </p:txBody>
+          </p:sp>
+          <p:sp>
+            <p:nvSpPr>
+              <p:cNvPr id="39" name="Rectangle 38"/>
+              <p:cNvSpPr/>
+              <p:nvPr/>
+            </p:nvSpPr>
+            <p:spPr>
+              <a:xfrm>
+                <a:off x="3330" y="4997"/>
+                <a:ext cx="460" cy="580"/>
+              </a:xfrm>
+              <a:prstGeom prst="rect">
+                <a:avLst/>
+              </a:prstGeom>
+              <a:noFill/>
+              <a:ln>
+                <a:solidFill>
+                  <a:schemeClr val="tx1"/>
+                </a:solidFill>
+              </a:ln>
+              <a:extLst>
+                <a:ext uri="{909E8E84-426E-40DD-AFC4-6F175D3DCCD1}">
+                  <a14:hiddenFill xmlns:a14="http://schemas.microsoft.com/office/drawing/2010/main">
+                    <a:solidFill>
+                      <a:schemeClr val="accent1"/>
+                    </a:solidFill>
+                  </a14:hiddenFill>
+                </a:ext>
+              </a:extLst>
+            </p:spPr>
+            <p:style>
+              <a:lnRef idx="2">
+                <a:schemeClr val="accent1">
+                  <a:shade val="50000"/>
+                </a:schemeClr>
+              </a:lnRef>
+              <a:fillRef idx="1">
+                <a:schemeClr val="accent1"/>
+              </a:fillRef>
+              <a:effectRef idx="0">
+                <a:schemeClr val="accent1"/>
+              </a:effectRef>
+              <a:fontRef idx="minor">
+                <a:schemeClr val="lt1"/>
+              </a:fontRef>
+            </p:style>
+            <p:txBody>
+              <a:bodyPr rtlCol="0" anchor="ctr"/>
+              <a:p>
+                <a:pPr algn="ctr"/>
+                <a:endParaRPr lang="en-US"/>
+              </a:p>
+            </p:txBody>
+          </p:sp>
+        </p:grpSp>
+        <p:grpSp>
+          <p:nvGrpSpPr>
+            <p:cNvPr id="40" name="Group 39"/>
+            <p:cNvGrpSpPr/>
+            <p:nvPr/>
+          </p:nvGrpSpPr>
+          <p:grpSpPr>
+            <a:xfrm>
+              <a:off x="7088" y="5071"/>
+              <a:ext cx="461" cy="580"/>
+              <a:chOff x="3330" y="4997"/>
+              <a:chExt cx="461" cy="580"/>
+            </a:xfrm>
+          </p:grpSpPr>
+          <p:sp>
+            <p:nvSpPr>
+              <p:cNvPr id="41" name="Text Box 40"/>
+              <p:cNvSpPr txBox="1"/>
+              <p:nvPr/>
+            </p:nvSpPr>
+            <p:spPr>
+              <a:xfrm>
+                <a:off x="3330" y="4997"/>
+                <a:ext cx="461" cy="580"/>
+              </a:xfrm>
+              <a:prstGeom prst="rect">
+                <a:avLst/>
+              </a:prstGeom>
+              <a:noFill/>
+            </p:spPr>
+            <p:txBody>
+              <a:bodyPr wrap="square" rtlCol="0">
+                <a:spAutoFit/>
+              </a:bodyPr>
+              <a:p>
+                <a:pPr fontAlgn="auto"/>
+                <a:r>
+                  <a:rPr lang="pt-PT" altLang="en-US"/>
+                  <a:t>0</a:t>
+                </a:r>
+                <a:endParaRPr lang="pt-PT" altLang="en-US"/>
+              </a:p>
+            </p:txBody>
+          </p:sp>
+          <p:sp>
+            <p:nvSpPr>
+              <p:cNvPr id="42" name="Rectangle 41"/>
+              <p:cNvSpPr/>
+              <p:nvPr/>
+            </p:nvSpPr>
+            <p:spPr>
+              <a:xfrm>
+                <a:off x="3330" y="4997"/>
+                <a:ext cx="460" cy="580"/>
+              </a:xfrm>
+              <a:prstGeom prst="rect">
+                <a:avLst/>
+              </a:prstGeom>
+              <a:noFill/>
+              <a:ln>
+                <a:solidFill>
+                  <a:schemeClr val="tx1"/>
+                </a:solidFill>
+              </a:ln>
+              <a:extLst>
+                <a:ext uri="{909E8E84-426E-40DD-AFC4-6F175D3DCCD1}">
+                  <a14:hiddenFill xmlns:a14="http://schemas.microsoft.com/office/drawing/2010/main">
+                    <a:solidFill>
+                      <a:schemeClr val="accent1"/>
+                    </a:solidFill>
+                  </a14:hiddenFill>
+                </a:ext>
+              </a:extLst>
+            </p:spPr>
+            <p:style>
+              <a:lnRef idx="2">
+                <a:schemeClr val="accent1">
+                  <a:shade val="50000"/>
+                </a:schemeClr>
+              </a:lnRef>
+              <a:fillRef idx="1">
+                <a:schemeClr val="accent1"/>
+              </a:fillRef>
+              <a:effectRef idx="0">
+                <a:schemeClr val="accent1"/>
+              </a:effectRef>
+              <a:fontRef idx="minor">
+                <a:schemeClr val="lt1"/>
+              </a:fontRef>
+            </p:style>
+            <p:txBody>
+              <a:bodyPr rtlCol="0" anchor="ctr"/>
+              <a:p>
+                <a:pPr algn="ctr"/>
+                <a:endParaRPr lang="en-US"/>
+              </a:p>
+            </p:txBody>
+          </p:sp>
+        </p:grpSp>
+        <p:grpSp>
+          <p:nvGrpSpPr>
+            <p:cNvPr id="43" name="Group 42"/>
+            <p:cNvGrpSpPr/>
+            <p:nvPr/>
+          </p:nvGrpSpPr>
+          <p:grpSpPr>
+            <a:xfrm>
+              <a:off x="10776" y="5071"/>
+              <a:ext cx="460" cy="580"/>
+              <a:chOff x="3330" y="4997"/>
+              <a:chExt cx="460" cy="580"/>
+            </a:xfrm>
+          </p:grpSpPr>
+          <p:sp>
+            <p:nvSpPr>
+              <p:cNvPr id="44" name="Text Box 43"/>
+              <p:cNvSpPr txBox="1"/>
+              <p:nvPr/>
+            </p:nvSpPr>
+            <p:spPr>
+              <a:xfrm>
+                <a:off x="3330" y="4997"/>
+                <a:ext cx="461" cy="580"/>
+              </a:xfrm>
+              <a:prstGeom prst="rect">
+                <a:avLst/>
+              </a:prstGeom>
+              <a:noFill/>
+            </p:spPr>
+            <p:txBody>
+              <a:bodyPr wrap="square" rtlCol="0">
+                <a:spAutoFit/>
+              </a:bodyPr>
+              <a:p>
+                <a:pPr fontAlgn="auto"/>
+                <a:r>
+                  <a:rPr lang="pt-PT" altLang="en-US"/>
+                  <a:t>1</a:t>
+                </a:r>
+                <a:endParaRPr lang="pt-PT" altLang="en-US"/>
+              </a:p>
+            </p:txBody>
+          </p:sp>
+          <p:sp>
+            <p:nvSpPr>
+              <p:cNvPr id="45" name="Rectangle 44"/>
+              <p:cNvSpPr/>
+              <p:nvPr/>
+            </p:nvSpPr>
+            <p:spPr>
+              <a:xfrm>
+                <a:off x="3330" y="4997"/>
+                <a:ext cx="460" cy="580"/>
+              </a:xfrm>
+              <a:prstGeom prst="rect">
+                <a:avLst/>
+              </a:prstGeom>
+              <a:noFill/>
+              <a:ln>
+                <a:solidFill>
+                  <a:schemeClr val="tx1"/>
+                </a:solidFill>
+              </a:ln>
+              <a:extLst>
+                <a:ext uri="{909E8E84-426E-40DD-AFC4-6F175D3DCCD1}">
+                  <a14:hiddenFill xmlns:a14="http://schemas.microsoft.com/office/drawing/2010/main">
+                    <a:solidFill>
+                      <a:schemeClr val="accent1"/>
+                    </a:solidFill>
+                  </a14:hiddenFill>
+                </a:ext>
+              </a:extLst>
+            </p:spPr>
+            <p:style>
+              <a:lnRef idx="2">
+                <a:schemeClr val="accent1">
+                  <a:shade val="50000"/>
+                </a:schemeClr>
+              </a:lnRef>
+              <a:fillRef idx="1">
+                <a:schemeClr val="accent1"/>
+              </a:fillRef>
+              <a:effectRef idx="0">
+                <a:schemeClr val="accent1"/>
+              </a:effectRef>
+              <a:fontRef idx="minor">
+                <a:schemeClr val="lt1"/>
+              </a:fontRef>
+            </p:style>
+            <p:txBody>
+              <a:bodyPr rtlCol="0" anchor="ctr"/>
+              <a:p>
+                <a:pPr algn="ctr"/>
+                <a:endParaRPr lang="en-US"/>
+              </a:p>
+            </p:txBody>
+          </p:sp>
+        </p:grpSp>
+        <p:sp>
+          <p:nvSpPr>
+            <p:cNvPr id="48" name="Rectangle 47"/>
+            <p:cNvSpPr/>
+            <p:nvPr/>
+          </p:nvSpPr>
+          <p:spPr>
+            <a:xfrm>
+              <a:off x="9396" y="5071"/>
+              <a:ext cx="460" cy="580"/>
+            </a:xfrm>
+            <a:prstGeom prst="rect">
+              <a:avLst/>
+            </a:prstGeom>
+            <a:noFill/>
+            <a:ln>
+              <a:solidFill>
+                <a:schemeClr val="tx1"/>
+              </a:solidFill>
+            </a:ln>
+            <a:extLst>
+              <a:ext uri="{909E8E84-426E-40DD-AFC4-6F175D3DCCD1}">
+                <a14:hiddenFill xmlns:a14="http://schemas.microsoft.com/office/drawing/2010/main">
+                  <a:solidFill>
+                    <a:schemeClr val="accent1"/>
+                  </a:solidFill>
+                </a14:hiddenFill>
+              </a:ext>
+            </a:extLst>
+          </p:spPr>
+          <p:style>
+            <a:lnRef idx="2">
+              <a:schemeClr val="accent1">
+                <a:shade val="50000"/>
+              </a:schemeClr>
+            </a:lnRef>
+            <a:fillRef idx="1">
+              <a:schemeClr val="accent1"/>
+            </a:fillRef>
+            <a:effectRef idx="0">
+              <a:schemeClr val="accent1"/>
+            </a:effectRef>
+            <a:fontRef idx="minor">
+              <a:schemeClr val="lt1"/>
+            </a:fontRef>
+          </p:style>
+          <p:txBody>
+            <a:bodyPr rtlCol="0" anchor="ctr"/>
+            <a:p>
+              <a:pPr algn="ctr"/>
+              <a:endParaRPr lang="en-US"/>
+            </a:p>
+          </p:txBody>
+        </p:sp>
+        <p:grpSp>
+          <p:nvGrpSpPr>
+            <p:cNvPr id="49" name="Group 48"/>
+            <p:cNvGrpSpPr/>
+            <p:nvPr/>
+          </p:nvGrpSpPr>
+          <p:grpSpPr>
+            <a:xfrm>
+              <a:off x="8935" y="5071"/>
+              <a:ext cx="460" cy="580"/>
+              <a:chOff x="3330" y="4997"/>
+              <a:chExt cx="460" cy="580"/>
+            </a:xfrm>
+          </p:grpSpPr>
+          <p:sp>
+            <p:nvSpPr>
+              <p:cNvPr id="50" name="Text Box 49"/>
+              <p:cNvSpPr txBox="1"/>
+              <p:nvPr/>
+            </p:nvSpPr>
+            <p:spPr>
+              <a:xfrm>
+                <a:off x="3330" y="4997"/>
+                <a:ext cx="461" cy="580"/>
+              </a:xfrm>
+              <a:prstGeom prst="rect">
+                <a:avLst/>
+              </a:prstGeom>
+              <a:noFill/>
+            </p:spPr>
+            <p:txBody>
+              <a:bodyPr wrap="square" rtlCol="0">
+                <a:spAutoFit/>
+              </a:bodyPr>
+              <a:p>
+                <a:pPr fontAlgn="auto"/>
+                <a:r>
+                  <a:rPr lang="pt-PT" altLang="en-US"/>
+                  <a:t>1</a:t>
+                </a:r>
+                <a:endParaRPr lang="pt-PT" altLang="en-US"/>
+              </a:p>
+            </p:txBody>
+          </p:sp>
+          <p:sp>
+            <p:nvSpPr>
+              <p:cNvPr id="51" name="Rectangle 50"/>
+              <p:cNvSpPr/>
+              <p:nvPr/>
+            </p:nvSpPr>
+            <p:spPr>
+              <a:xfrm>
+                <a:off x="3330" y="4997"/>
+                <a:ext cx="460" cy="580"/>
+              </a:xfrm>
+              <a:prstGeom prst="rect">
+                <a:avLst/>
+              </a:prstGeom>
+              <a:noFill/>
+              <a:ln>
+                <a:solidFill>
+                  <a:schemeClr val="tx1"/>
+                </a:solidFill>
+              </a:ln>
+              <a:extLst>
+                <a:ext uri="{909E8E84-426E-40DD-AFC4-6F175D3DCCD1}">
+                  <a14:hiddenFill xmlns:a14="http://schemas.microsoft.com/office/drawing/2010/main">
+                    <a:solidFill>
+                      <a:schemeClr val="accent1"/>
+                    </a:solidFill>
+                  </a14:hiddenFill>
+                </a:ext>
+              </a:extLst>
+            </p:spPr>
+            <p:style>
+              <a:lnRef idx="2">
+                <a:schemeClr val="accent1">
+                  <a:shade val="50000"/>
+                </a:schemeClr>
+              </a:lnRef>
+              <a:fillRef idx="1">
+                <a:schemeClr val="accent1"/>
+              </a:fillRef>
+              <a:effectRef idx="0">
+                <a:schemeClr val="accent1"/>
+              </a:effectRef>
+              <a:fontRef idx="minor">
+                <a:schemeClr val="lt1"/>
+              </a:fontRef>
+            </p:style>
+            <p:txBody>
+              <a:bodyPr rtlCol="0" anchor="ctr"/>
+              <a:p>
+                <a:pPr algn="ctr"/>
+                <a:endParaRPr lang="en-US"/>
+              </a:p>
+            </p:txBody>
+          </p:sp>
+        </p:grpSp>
+        <p:grpSp>
+          <p:nvGrpSpPr>
+            <p:cNvPr id="52" name="Group 51"/>
+            <p:cNvGrpSpPr/>
+            <p:nvPr/>
+          </p:nvGrpSpPr>
+          <p:grpSpPr>
+            <a:xfrm>
+              <a:off x="8013" y="5071"/>
+              <a:ext cx="461" cy="580"/>
+              <a:chOff x="3330" y="4997"/>
+              <a:chExt cx="461" cy="580"/>
+            </a:xfrm>
+          </p:grpSpPr>
+          <p:sp>
+            <p:nvSpPr>
+              <p:cNvPr id="53" name="Text Box 52"/>
+              <p:cNvSpPr txBox="1"/>
+              <p:nvPr/>
+            </p:nvSpPr>
+            <p:spPr>
+              <a:xfrm>
+                <a:off x="3330" y="4997"/>
+                <a:ext cx="461" cy="580"/>
+              </a:xfrm>
+              <a:prstGeom prst="rect">
+                <a:avLst/>
+              </a:prstGeom>
+              <a:noFill/>
+            </p:spPr>
+            <p:txBody>
+              <a:bodyPr wrap="square" rtlCol="0">
+                <a:spAutoFit/>
+              </a:bodyPr>
+              <a:p>
+                <a:pPr fontAlgn="auto"/>
+                <a:r>
+                  <a:rPr lang="pt-PT" altLang="en-US"/>
+                  <a:t>0</a:t>
+                </a:r>
+                <a:endParaRPr lang="pt-PT" altLang="en-US"/>
+              </a:p>
+            </p:txBody>
+          </p:sp>
+          <p:sp>
+            <p:nvSpPr>
+              <p:cNvPr id="54" name="Rectangle 53"/>
+              <p:cNvSpPr/>
+              <p:nvPr/>
+            </p:nvSpPr>
+            <p:spPr>
+              <a:xfrm>
+                <a:off x="3330" y="4997"/>
+                <a:ext cx="460" cy="580"/>
+              </a:xfrm>
+              <a:prstGeom prst="rect">
+                <a:avLst/>
+              </a:prstGeom>
+              <a:noFill/>
+              <a:ln>
+                <a:solidFill>
+                  <a:schemeClr val="tx1"/>
+                </a:solidFill>
+              </a:ln>
+              <a:extLst>
+                <a:ext uri="{909E8E84-426E-40DD-AFC4-6F175D3DCCD1}">
+                  <a14:hiddenFill xmlns:a14="http://schemas.microsoft.com/office/drawing/2010/main">
+                    <a:solidFill>
+                      <a:schemeClr val="accent1"/>
+                    </a:solidFill>
+                  </a14:hiddenFill>
+                </a:ext>
+              </a:extLst>
+            </p:spPr>
+            <p:style>
+              <a:lnRef idx="2">
+                <a:schemeClr val="accent1">
+                  <a:shade val="50000"/>
+                </a:schemeClr>
+              </a:lnRef>
+              <a:fillRef idx="1">
+                <a:schemeClr val="accent1"/>
+              </a:fillRef>
+              <a:effectRef idx="0">
+                <a:schemeClr val="accent1"/>
+              </a:effectRef>
+              <a:fontRef idx="minor">
+                <a:schemeClr val="lt1"/>
+              </a:fontRef>
+            </p:style>
+            <p:txBody>
+              <a:bodyPr rtlCol="0" anchor="ctr"/>
+              <a:p>
+                <a:pPr algn="ctr"/>
+                <a:endParaRPr lang="en-US"/>
+              </a:p>
+            </p:txBody>
+          </p:sp>
+        </p:grpSp>
+        <p:grpSp>
+          <p:nvGrpSpPr>
+            <p:cNvPr id="55" name="Group 54"/>
+            <p:cNvGrpSpPr/>
+            <p:nvPr/>
+          </p:nvGrpSpPr>
+          <p:grpSpPr>
+            <a:xfrm>
+              <a:off x="12158" y="5071"/>
+              <a:ext cx="461" cy="580"/>
+              <a:chOff x="3330" y="4997"/>
+              <a:chExt cx="461" cy="580"/>
+            </a:xfrm>
+          </p:grpSpPr>
+          <p:sp>
+            <p:nvSpPr>
+              <p:cNvPr id="56" name="Text Box 55"/>
+              <p:cNvSpPr txBox="1"/>
+              <p:nvPr/>
+            </p:nvSpPr>
+            <p:spPr>
+              <a:xfrm>
+                <a:off x="3330" y="4997"/>
+                <a:ext cx="461" cy="580"/>
+              </a:xfrm>
+              <a:prstGeom prst="rect">
+                <a:avLst/>
+              </a:prstGeom>
+              <a:noFill/>
+            </p:spPr>
+            <p:txBody>
+              <a:bodyPr wrap="square" rtlCol="0">
+                <a:spAutoFit/>
+              </a:bodyPr>
+              <a:p>
+                <a:pPr fontAlgn="auto"/>
+                <a:r>
+                  <a:rPr lang="pt-PT" altLang="en-US"/>
+                  <a:t>0</a:t>
+                </a:r>
+                <a:endParaRPr lang="pt-PT" altLang="en-US"/>
+              </a:p>
+            </p:txBody>
+          </p:sp>
+          <p:sp>
+            <p:nvSpPr>
+              <p:cNvPr id="57" name="Rectangle 56"/>
+              <p:cNvSpPr/>
+              <p:nvPr/>
+            </p:nvSpPr>
+            <p:spPr>
+              <a:xfrm>
+                <a:off x="3330" y="4997"/>
+                <a:ext cx="460" cy="580"/>
+              </a:xfrm>
+              <a:prstGeom prst="rect">
+                <a:avLst/>
+              </a:prstGeom>
+              <a:noFill/>
+              <a:ln>
+                <a:solidFill>
+                  <a:schemeClr val="tx1"/>
+                </a:solidFill>
+              </a:ln>
+              <a:extLst>
+                <a:ext uri="{909E8E84-426E-40DD-AFC4-6F175D3DCCD1}">
+                  <a14:hiddenFill xmlns:a14="http://schemas.microsoft.com/office/drawing/2010/main">
+                    <a:solidFill>
+                      <a:schemeClr val="accent1"/>
+                    </a:solidFill>
+                  </a14:hiddenFill>
+                </a:ext>
+              </a:extLst>
+            </p:spPr>
+            <p:style>
+              <a:lnRef idx="2">
+                <a:schemeClr val="accent1">
+                  <a:shade val="50000"/>
+                </a:schemeClr>
+              </a:lnRef>
+              <a:fillRef idx="1">
+                <a:schemeClr val="accent1"/>
+              </a:fillRef>
+              <a:effectRef idx="0">
+                <a:schemeClr val="accent1"/>
+              </a:effectRef>
+              <a:fontRef idx="minor">
+                <a:schemeClr val="lt1"/>
+              </a:fontRef>
+            </p:style>
+            <p:txBody>
+              <a:bodyPr rtlCol="0" anchor="ctr"/>
+              <a:p>
+                <a:pPr algn="ctr"/>
+                <a:endParaRPr lang="en-US"/>
+              </a:p>
+            </p:txBody>
+          </p:sp>
+        </p:grpSp>
+        <p:grpSp>
+          <p:nvGrpSpPr>
+            <p:cNvPr id="58" name="Group 57"/>
+            <p:cNvGrpSpPr/>
+            <p:nvPr/>
+          </p:nvGrpSpPr>
+          <p:grpSpPr>
+            <a:xfrm>
+              <a:off x="12619" y="5071"/>
+              <a:ext cx="460" cy="580"/>
+              <a:chOff x="3330" y="4997"/>
+              <a:chExt cx="460" cy="580"/>
+            </a:xfrm>
+          </p:grpSpPr>
+          <p:sp>
+            <p:nvSpPr>
+              <p:cNvPr id="59" name="Text Box 58"/>
+              <p:cNvSpPr txBox="1"/>
+              <p:nvPr/>
+            </p:nvSpPr>
+            <p:spPr>
+              <a:xfrm>
+                <a:off x="3330" y="4997"/>
+                <a:ext cx="461" cy="580"/>
+              </a:xfrm>
+              <a:prstGeom prst="rect">
+                <a:avLst/>
+              </a:prstGeom>
+              <a:noFill/>
+            </p:spPr>
+            <p:txBody>
+              <a:bodyPr wrap="square" rtlCol="0">
+                <a:spAutoFit/>
+              </a:bodyPr>
+              <a:p>
+                <a:pPr fontAlgn="auto"/>
+                <a:r>
+                  <a:rPr lang="pt-PT" altLang="en-US"/>
+                  <a:t>1</a:t>
+                </a:r>
+                <a:endParaRPr lang="pt-PT" altLang="en-US"/>
+              </a:p>
+            </p:txBody>
+          </p:sp>
+          <p:sp>
+            <p:nvSpPr>
+              <p:cNvPr id="60" name="Rectangle 59"/>
+              <p:cNvSpPr/>
+              <p:nvPr/>
+            </p:nvSpPr>
+            <p:spPr>
+              <a:xfrm>
+                <a:off x="3330" y="4997"/>
+                <a:ext cx="460" cy="580"/>
+              </a:xfrm>
+              <a:prstGeom prst="rect">
+                <a:avLst/>
+              </a:prstGeom>
+              <a:noFill/>
+              <a:ln>
+                <a:solidFill>
+                  <a:schemeClr val="tx1"/>
+                </a:solidFill>
+              </a:ln>
+              <a:extLst>
+                <a:ext uri="{909E8E84-426E-40DD-AFC4-6F175D3DCCD1}">
+                  <a14:hiddenFill xmlns:a14="http://schemas.microsoft.com/office/drawing/2010/main">
+                    <a:solidFill>
+                      <a:schemeClr val="accent1"/>
+                    </a:solidFill>
+                  </a14:hiddenFill>
+                </a:ext>
+              </a:extLst>
+            </p:spPr>
+            <p:style>
+              <a:lnRef idx="2">
+                <a:schemeClr val="accent1">
+                  <a:shade val="50000"/>
+                </a:schemeClr>
+              </a:lnRef>
+              <a:fillRef idx="1">
+                <a:schemeClr val="accent1"/>
+              </a:fillRef>
+              <a:effectRef idx="0">
+                <a:schemeClr val="accent1"/>
+              </a:effectRef>
+              <a:fontRef idx="minor">
+                <a:schemeClr val="lt1"/>
+              </a:fontRef>
+            </p:style>
+            <p:txBody>
+              <a:bodyPr rtlCol="0" anchor="ctr"/>
+              <a:p>
+                <a:pPr algn="ctr"/>
+                <a:endParaRPr lang="en-US"/>
+              </a:p>
+            </p:txBody>
+          </p:sp>
+        </p:grpSp>
+        <p:grpSp>
+          <p:nvGrpSpPr>
+            <p:cNvPr id="61" name="Group 60"/>
+            <p:cNvGrpSpPr/>
+            <p:nvPr/>
+          </p:nvGrpSpPr>
+          <p:grpSpPr>
+            <a:xfrm>
+              <a:off x="11698" y="5071"/>
+              <a:ext cx="460" cy="580"/>
+              <a:chOff x="3330" y="4997"/>
+              <a:chExt cx="460" cy="580"/>
+            </a:xfrm>
+          </p:grpSpPr>
+          <p:sp>
+            <p:nvSpPr>
+              <p:cNvPr id="62" name="Text Box 61"/>
+              <p:cNvSpPr txBox="1"/>
+              <p:nvPr/>
+            </p:nvSpPr>
+            <p:spPr>
+              <a:xfrm>
+                <a:off x="3330" y="4997"/>
+                <a:ext cx="461" cy="580"/>
+              </a:xfrm>
+              <a:prstGeom prst="rect">
+                <a:avLst/>
+              </a:prstGeom>
+              <a:noFill/>
+            </p:spPr>
+            <p:txBody>
+              <a:bodyPr wrap="square" rtlCol="0">
+                <a:spAutoFit/>
+              </a:bodyPr>
+              <a:p>
+                <a:pPr fontAlgn="auto"/>
+                <a:r>
+                  <a:rPr lang="pt-PT" altLang="en-US"/>
+                  <a:t>1</a:t>
+                </a:r>
+                <a:endParaRPr lang="pt-PT" altLang="en-US"/>
+              </a:p>
+            </p:txBody>
+          </p:sp>
+          <p:sp>
+            <p:nvSpPr>
+              <p:cNvPr id="63" name="Rectangle 62"/>
+              <p:cNvSpPr/>
+              <p:nvPr/>
+            </p:nvSpPr>
+            <p:spPr>
+              <a:xfrm>
+                <a:off x="3330" y="4997"/>
+                <a:ext cx="460" cy="580"/>
+              </a:xfrm>
+              <a:prstGeom prst="rect">
+                <a:avLst/>
+              </a:prstGeom>
+              <a:noFill/>
+              <a:ln>
+                <a:solidFill>
+                  <a:schemeClr val="tx1"/>
+                </a:solidFill>
+              </a:ln>
+              <a:extLst>
+                <a:ext uri="{909E8E84-426E-40DD-AFC4-6F175D3DCCD1}">
+                  <a14:hiddenFill xmlns:a14="http://schemas.microsoft.com/office/drawing/2010/main">
+                    <a:solidFill>
+                      <a:schemeClr val="accent1"/>
+                    </a:solidFill>
+                  </a14:hiddenFill>
+                </a:ext>
+              </a:extLst>
+            </p:spPr>
+            <p:style>
+              <a:lnRef idx="2">
+                <a:schemeClr val="accent1">
+                  <a:shade val="50000"/>
+                </a:schemeClr>
+              </a:lnRef>
+              <a:fillRef idx="1">
+                <a:schemeClr val="accent1"/>
+              </a:fillRef>
+              <a:effectRef idx="0">
+                <a:schemeClr val="accent1"/>
+              </a:effectRef>
+              <a:fontRef idx="minor">
+                <a:schemeClr val="lt1"/>
+              </a:fontRef>
+            </p:style>
+            <p:txBody>
+              <a:bodyPr rtlCol="0" anchor="ctr"/>
+              <a:p>
+                <a:pPr algn="ctr"/>
+                <a:endParaRPr lang="en-US"/>
+              </a:p>
+            </p:txBody>
+          </p:sp>
+        </p:grpSp>
+        <p:grpSp>
+          <p:nvGrpSpPr>
+            <p:cNvPr id="64" name="Group 63"/>
+            <p:cNvGrpSpPr/>
+            <p:nvPr/>
+          </p:nvGrpSpPr>
+          <p:grpSpPr>
+            <a:xfrm>
+              <a:off x="11237" y="5071"/>
+              <a:ext cx="461" cy="580"/>
+              <a:chOff x="3330" y="4997"/>
+              <a:chExt cx="461" cy="580"/>
+            </a:xfrm>
+          </p:grpSpPr>
+          <p:sp>
+            <p:nvSpPr>
+              <p:cNvPr id="65" name="Text Box 64"/>
+              <p:cNvSpPr txBox="1"/>
+              <p:nvPr/>
+            </p:nvSpPr>
+            <p:spPr>
+              <a:xfrm>
+                <a:off x="3330" y="4997"/>
+                <a:ext cx="461" cy="580"/>
+              </a:xfrm>
+              <a:prstGeom prst="rect">
+                <a:avLst/>
+              </a:prstGeom>
+              <a:noFill/>
+            </p:spPr>
+            <p:txBody>
+              <a:bodyPr wrap="square" rtlCol="0">
+                <a:spAutoFit/>
+              </a:bodyPr>
+              <a:p>
+                <a:pPr fontAlgn="auto"/>
+                <a:r>
+                  <a:rPr lang="pt-PT" altLang="en-US"/>
+                  <a:t>0</a:t>
+                </a:r>
+                <a:endParaRPr lang="pt-PT" altLang="en-US"/>
+              </a:p>
+            </p:txBody>
+          </p:sp>
+          <p:sp>
+            <p:nvSpPr>
+              <p:cNvPr id="66" name="Rectangle 65"/>
+              <p:cNvSpPr/>
+              <p:nvPr/>
+            </p:nvSpPr>
+            <p:spPr>
+              <a:xfrm>
+                <a:off x="3330" y="4997"/>
+                <a:ext cx="460" cy="580"/>
+              </a:xfrm>
+              <a:prstGeom prst="rect">
+                <a:avLst/>
+              </a:prstGeom>
+              <a:noFill/>
+              <a:ln>
+                <a:solidFill>
+                  <a:schemeClr val="tx1"/>
+                </a:solidFill>
+              </a:ln>
+              <a:extLst>
+                <a:ext uri="{909E8E84-426E-40DD-AFC4-6F175D3DCCD1}">
+                  <a14:hiddenFill xmlns:a14="http://schemas.microsoft.com/office/drawing/2010/main">
+                    <a:solidFill>
+                      <a:schemeClr val="accent1"/>
+                    </a:solidFill>
+                  </a14:hiddenFill>
+                </a:ext>
+              </a:extLst>
+            </p:spPr>
+            <p:style>
+              <a:lnRef idx="2">
+                <a:schemeClr val="accent1">
+                  <a:shade val="50000"/>
+                </a:schemeClr>
+              </a:lnRef>
+              <a:fillRef idx="1">
+                <a:schemeClr val="accent1"/>
+              </a:fillRef>
+              <a:effectRef idx="0">
+                <a:schemeClr val="accent1"/>
+              </a:effectRef>
+              <a:fontRef idx="minor">
+                <a:schemeClr val="lt1"/>
+              </a:fontRef>
+            </p:style>
+            <p:txBody>
+              <a:bodyPr rtlCol="0" anchor="ctr"/>
+              <a:p>
+                <a:pPr algn="ctr"/>
+                <a:endParaRPr lang="en-US"/>
+              </a:p>
+            </p:txBody>
+          </p:sp>
+        </p:grpSp>
+        <p:sp>
+          <p:nvSpPr>
+            <p:cNvPr id="67" name="Right Brace 66"/>
+            <p:cNvSpPr/>
+            <p:nvPr/>
+          </p:nvSpPr>
+          <p:spPr>
+            <a:xfrm rot="16200000">
+              <a:off x="7449" y="4014"/>
+              <a:ext cx="203" cy="1844"/>
+            </a:xfrm>
+            <a:prstGeom prst="rightBrace">
+              <a:avLst>
+                <a:gd name="adj1" fmla="val 0"/>
+                <a:gd name="adj2" fmla="val 50000"/>
+              </a:avLst>
+            </a:prstGeom>
+            <a:ln>
+              <a:solidFill>
+                <a:schemeClr val="tx1"/>
+              </a:solidFill>
+            </a:ln>
+          </p:spPr>
+          <p:style>
+            <a:lnRef idx="1">
+              <a:schemeClr val="accent1"/>
+            </a:lnRef>
+            <a:fillRef idx="0">
+              <a:schemeClr val="accent1"/>
+            </a:fillRef>
+            <a:effectRef idx="0">
+              <a:schemeClr val="accent1"/>
+            </a:effectRef>
+            <a:fontRef idx="minor">
+              <a:schemeClr val="tx1"/>
+            </a:fontRef>
+          </p:style>
+          <p:txBody>
+            <a:bodyPr rtlCol="0" anchor="ctr"/>
+            <a:p>
+              <a:pPr algn="ctr"/>
+              <a:endParaRPr lang="en-US"/>
+            </a:p>
+          </p:txBody>
+        </p:sp>
+        <p:sp>
+          <p:nvSpPr>
+            <p:cNvPr id="68" name="Right Brace 67"/>
+            <p:cNvSpPr/>
+            <p:nvPr/>
+          </p:nvSpPr>
+          <p:spPr>
+            <a:xfrm rot="16200000">
+              <a:off x="8833" y="4475"/>
+              <a:ext cx="203" cy="922"/>
+            </a:xfrm>
+            <a:prstGeom prst="rightBrace">
+              <a:avLst>
+                <a:gd name="adj1" fmla="val 0"/>
+                <a:gd name="adj2" fmla="val 50000"/>
+              </a:avLst>
+            </a:prstGeom>
+            <a:ln>
+              <a:solidFill>
+                <a:schemeClr val="tx1"/>
+              </a:solidFill>
+            </a:ln>
+          </p:spPr>
+          <p:style>
+            <a:lnRef idx="1">
+              <a:schemeClr val="accent1"/>
+            </a:lnRef>
+            <a:fillRef idx="0">
+              <a:schemeClr val="accent1"/>
+            </a:fillRef>
+            <a:effectRef idx="0">
+              <a:schemeClr val="accent1"/>
+            </a:effectRef>
+            <a:fontRef idx="minor">
+              <a:schemeClr val="tx1"/>
+            </a:fontRef>
+          </p:style>
+          <p:txBody>
+            <a:bodyPr rtlCol="0" anchor="ctr"/>
+            <a:p>
+              <a:pPr algn="ctr"/>
+              <a:endParaRPr lang="en-US"/>
+            </a:p>
+          </p:txBody>
+        </p:sp>
+        <p:sp>
+          <p:nvSpPr>
+            <p:cNvPr id="69" name="Right Brace 68"/>
+            <p:cNvSpPr/>
+            <p:nvPr/>
+          </p:nvSpPr>
+          <p:spPr>
+            <a:xfrm rot="16200000">
+              <a:off x="11826" y="3784"/>
+              <a:ext cx="203" cy="2305"/>
+            </a:xfrm>
+            <a:prstGeom prst="rightBrace">
+              <a:avLst>
+                <a:gd name="adj1" fmla="val 0"/>
+                <a:gd name="adj2" fmla="val 50000"/>
+              </a:avLst>
+            </a:prstGeom>
+            <a:ln>
+              <a:solidFill>
+                <a:schemeClr val="tx1"/>
+              </a:solidFill>
+            </a:ln>
+          </p:spPr>
+          <p:style>
+            <a:lnRef idx="1">
+              <a:schemeClr val="accent1"/>
+            </a:lnRef>
+            <a:fillRef idx="0">
+              <a:schemeClr val="accent1"/>
+            </a:fillRef>
+            <a:effectRef idx="0">
+              <a:schemeClr val="accent1"/>
+            </a:effectRef>
+            <a:fontRef idx="minor">
+              <a:schemeClr val="tx1"/>
+            </a:fontRef>
+          </p:style>
+          <p:txBody>
+            <a:bodyPr rtlCol="0" anchor="ctr"/>
+            <a:p>
+              <a:pPr algn="ctr"/>
+              <a:endParaRPr lang="en-US"/>
+            </a:p>
+          </p:txBody>
+        </p:sp>
+        <p:sp>
+          <p:nvSpPr>
+            <p:cNvPr id="74" name="Rectangle 73"/>
+            <p:cNvSpPr/>
+            <p:nvPr/>
+          </p:nvSpPr>
+          <p:spPr>
+            <a:xfrm>
+              <a:off x="10316" y="5071"/>
+              <a:ext cx="460" cy="580"/>
+            </a:xfrm>
+            <a:prstGeom prst="rect">
+              <a:avLst/>
+            </a:prstGeom>
+            <a:noFill/>
+            <a:ln>
+              <a:solidFill>
+                <a:schemeClr val="tx1"/>
+              </a:solidFill>
+            </a:ln>
+            <a:extLst>
+              <a:ext uri="{909E8E84-426E-40DD-AFC4-6F175D3DCCD1}">
+                <a14:hiddenFill xmlns:a14="http://schemas.microsoft.com/office/drawing/2010/main">
+                  <a:solidFill>
+                    <a:schemeClr val="accent1"/>
+                  </a:solidFill>
+                </a14:hiddenFill>
+              </a:ext>
+            </a:extLst>
+          </p:spPr>
+          <p:style>
+            <a:lnRef idx="2">
+              <a:schemeClr val="accent1">
+                <a:shade val="50000"/>
+              </a:schemeClr>
+            </a:lnRef>
+            <a:fillRef idx="1">
+              <a:schemeClr val="accent1"/>
+            </a:fillRef>
+            <a:effectRef idx="0">
+              <a:schemeClr val="accent1"/>
+            </a:effectRef>
+            <a:fontRef idx="minor">
+              <a:schemeClr val="lt1"/>
+            </a:fontRef>
+          </p:style>
+          <p:txBody>
+            <a:bodyPr rtlCol="0" anchor="ctr"/>
+            <a:p>
+              <a:pPr algn="ctr"/>
+              <a:endParaRPr lang="en-US"/>
+            </a:p>
+          </p:txBody>
+        </p:sp>
+        <p:grpSp>
+          <p:nvGrpSpPr>
+            <p:cNvPr id="75" name="Group 74"/>
+            <p:cNvGrpSpPr/>
+            <p:nvPr/>
+          </p:nvGrpSpPr>
+          <p:grpSpPr>
+            <a:xfrm>
+              <a:off x="9856" y="5071"/>
+              <a:ext cx="460" cy="580"/>
+              <a:chOff x="3330" y="4997"/>
+              <a:chExt cx="460" cy="580"/>
+            </a:xfrm>
+          </p:grpSpPr>
+          <p:sp>
+            <p:nvSpPr>
+              <p:cNvPr id="76" name="Text Box 75"/>
+              <p:cNvSpPr txBox="1"/>
+              <p:nvPr/>
+            </p:nvSpPr>
+            <p:spPr>
+              <a:xfrm>
+                <a:off x="3330" y="4997"/>
+                <a:ext cx="461" cy="580"/>
+              </a:xfrm>
+              <a:prstGeom prst="rect">
+                <a:avLst/>
+              </a:prstGeom>
+              <a:noFill/>
+            </p:spPr>
+            <p:txBody>
+              <a:bodyPr wrap="square" rtlCol="0">
+                <a:spAutoFit/>
+              </a:bodyPr>
+              <a:p>
+                <a:pPr fontAlgn="auto"/>
+                <a:r>
+                  <a:rPr lang="pt-PT" altLang="en-US"/>
+                  <a:t>1</a:t>
+                </a:r>
+                <a:endParaRPr lang="pt-PT" altLang="en-US"/>
+              </a:p>
+            </p:txBody>
+          </p:sp>
+          <p:sp>
+            <p:nvSpPr>
+              <p:cNvPr id="77" name="Rectangle 76"/>
+              <p:cNvSpPr/>
+              <p:nvPr/>
+            </p:nvSpPr>
+            <p:spPr>
+              <a:xfrm>
+                <a:off x="3330" y="4997"/>
+                <a:ext cx="460" cy="580"/>
+              </a:xfrm>
+              <a:prstGeom prst="rect">
+                <a:avLst/>
+              </a:prstGeom>
+              <a:noFill/>
+              <a:ln>
+                <a:solidFill>
+                  <a:schemeClr val="tx1"/>
+                </a:solidFill>
+              </a:ln>
+              <a:extLst>
+                <a:ext uri="{909E8E84-426E-40DD-AFC4-6F175D3DCCD1}">
+                  <a14:hiddenFill xmlns:a14="http://schemas.microsoft.com/office/drawing/2010/main">
+                    <a:solidFill>
+                      <a:schemeClr val="accent1"/>
+                    </a:solidFill>
+                  </a14:hiddenFill>
+                </a:ext>
+              </a:extLst>
+            </p:spPr>
+            <p:style>
+              <a:lnRef idx="2">
+                <a:schemeClr val="accent1">
+                  <a:shade val="50000"/>
+                </a:schemeClr>
+              </a:lnRef>
+              <a:fillRef idx="1">
+                <a:schemeClr val="accent1"/>
+              </a:fillRef>
+              <a:effectRef idx="0">
+                <a:schemeClr val="accent1"/>
+              </a:effectRef>
+              <a:fontRef idx="minor">
+                <a:schemeClr val="lt1"/>
+              </a:fontRef>
+            </p:style>
+            <p:txBody>
+              <a:bodyPr rtlCol="0" anchor="ctr"/>
+              <a:p>
+                <a:pPr algn="ctr"/>
+                <a:endParaRPr lang="en-US"/>
+              </a:p>
+            </p:txBody>
+          </p:sp>
+        </p:grpSp>
+        <p:sp>
+          <p:nvSpPr>
+            <p:cNvPr id="78" name="Rectangle 77"/>
+            <p:cNvSpPr/>
+            <p:nvPr/>
+          </p:nvSpPr>
+          <p:spPr>
+            <a:xfrm>
+              <a:off x="9639" y="4787"/>
+              <a:ext cx="894" cy="1148"/>
+            </a:xfrm>
+            <a:prstGeom prst="rect">
+              <a:avLst/>
+            </a:prstGeom>
+            <a:solidFill>
+              <a:schemeClr val="bg1"/>
+            </a:solidFill>
+            <a:ln>
+              <a:solidFill>
+                <a:schemeClr val="bg1"/>
+              </a:solidFill>
+            </a:ln>
+          </p:spPr>
+          <p:style>
+            <a:lnRef idx="2">
+              <a:schemeClr val="accent1">
+                <a:shade val="50000"/>
+              </a:schemeClr>
+            </a:lnRef>
+            <a:fillRef idx="1">
+              <a:schemeClr val="accent1"/>
+            </a:fillRef>
+            <a:effectRef idx="0">
+              <a:schemeClr val="accent1"/>
+            </a:effectRef>
+            <a:fontRef idx="minor">
+              <a:schemeClr val="lt1"/>
+            </a:fontRef>
+          </p:style>
+          <p:txBody>
+            <a:bodyPr rtlCol="0" anchor="ctr"/>
+            <a:p>
+              <a:pPr algn="ctr"/>
+              <a:endParaRPr lang="en-US"/>
+            </a:p>
+          </p:txBody>
+        </p:sp>
+        <p:sp>
+          <p:nvSpPr>
+            <p:cNvPr id="79" name="Text Box 78"/>
+            <p:cNvSpPr txBox="1"/>
+            <p:nvPr/>
+          </p:nvSpPr>
+          <p:spPr>
+            <a:xfrm>
+              <a:off x="9708" y="4835"/>
+              <a:ext cx="756" cy="822"/>
+            </a:xfrm>
+            <a:prstGeom prst="rect">
+              <a:avLst/>
+            </a:prstGeom>
+            <a:noFill/>
+          </p:spPr>
+          <p:txBody>
+            <a:bodyPr wrap="none" rtlCol="0">
+              <a:spAutoFit/>
+            </a:bodyPr>
+            <a:p>
+              <a:r>
+                <a:rPr lang="pt-PT" altLang="en-US" sz="2800"/>
+                <a:t>...</a:t>
+              </a:r>
+              <a:endParaRPr lang="pt-PT" altLang="en-US" sz="2800"/>
+            </a:p>
+          </p:txBody>
+        </p:sp>
+        <p:sp>
+          <p:nvSpPr>
+            <p:cNvPr id="80" name="Text Box 79"/>
+            <p:cNvSpPr txBox="1"/>
+            <p:nvPr/>
+          </p:nvSpPr>
+          <p:spPr>
+            <a:xfrm>
+              <a:off x="7222" y="4207"/>
+              <a:ext cx="658" cy="580"/>
+            </a:xfrm>
+            <a:prstGeom prst="rect">
+              <a:avLst/>
+            </a:prstGeom>
+            <a:noFill/>
+          </p:spPr>
+          <p:txBody>
+            <a:bodyPr wrap="none" rtlCol="0">
+              <a:spAutoFit/>
+            </a:bodyPr>
+            <a:p>
+              <a:r>
+                <a:rPr lang="pt-PT" altLang="en-US"/>
+                <a:t>X</a:t>
+              </a:r>
+              <a:r>
+                <a:rPr lang="pt-PT" altLang="en-US" baseline="-25000">
+                  <a:solidFill>
+                    <a:schemeClr val="tx1"/>
+                  </a:solidFill>
+                  <a:uFillTx/>
+                </a:rPr>
+                <a:t>1</a:t>
+              </a:r>
+              <a:endParaRPr lang="pt-PT" altLang="en-US" baseline="-25000">
+                <a:solidFill>
+                  <a:schemeClr val="tx1"/>
+                </a:solidFill>
+                <a:uFillTx/>
+              </a:endParaRPr>
+            </a:p>
+          </p:txBody>
+        </p:sp>
+        <p:sp>
+          <p:nvSpPr>
+            <p:cNvPr id="81" name="Text Box 80"/>
+            <p:cNvSpPr txBox="1"/>
+            <p:nvPr/>
+          </p:nvSpPr>
+          <p:spPr>
+            <a:xfrm>
+              <a:off x="8606" y="4207"/>
+              <a:ext cx="658" cy="580"/>
+            </a:xfrm>
+            <a:prstGeom prst="rect">
+              <a:avLst/>
+            </a:prstGeom>
+            <a:noFill/>
+          </p:spPr>
+          <p:txBody>
+            <a:bodyPr wrap="none" rtlCol="0">
+              <a:spAutoFit/>
+            </a:bodyPr>
+            <a:p>
+              <a:r>
+                <a:rPr lang="pt-PT" altLang="en-US"/>
+                <a:t>X</a:t>
+              </a:r>
+              <a:r>
+                <a:rPr lang="pt-PT" altLang="en-US" baseline="-25000">
+                  <a:solidFill>
+                    <a:schemeClr val="tx1"/>
+                  </a:solidFill>
+                  <a:uFillTx/>
+                </a:rPr>
+                <a:t>2</a:t>
+              </a:r>
+              <a:endParaRPr lang="pt-PT" altLang="en-US" baseline="-25000">
+                <a:solidFill>
+                  <a:schemeClr val="tx1"/>
+                </a:solidFill>
+                <a:uFillTx/>
+              </a:endParaRPr>
+            </a:p>
+          </p:txBody>
+        </p:sp>
+        <p:sp>
+          <p:nvSpPr>
+            <p:cNvPr id="82" name="Text Box 81"/>
+            <p:cNvSpPr txBox="1"/>
+            <p:nvPr/>
+          </p:nvSpPr>
+          <p:spPr>
+            <a:xfrm>
+              <a:off x="11598" y="4207"/>
+              <a:ext cx="697" cy="580"/>
+            </a:xfrm>
+            <a:prstGeom prst="rect">
+              <a:avLst/>
+            </a:prstGeom>
+            <a:noFill/>
+          </p:spPr>
+          <p:txBody>
+            <a:bodyPr wrap="none" rtlCol="0">
+              <a:spAutoFit/>
+            </a:bodyPr>
+            <a:p>
+              <a:r>
+                <a:rPr lang="pt-PT" altLang="en-US"/>
+                <a:t>X</a:t>
+              </a:r>
+              <a:r>
+                <a:rPr lang="pt-PT" altLang="en-US" baseline="-25000">
+                  <a:solidFill>
+                    <a:schemeClr val="tx1"/>
+                  </a:solidFill>
+                  <a:uFillTx/>
+                </a:rPr>
+                <a:t>N</a:t>
+              </a:r>
+              <a:endParaRPr lang="pt-PT" altLang="en-US" baseline="-25000">
+                <a:solidFill>
+                  <a:schemeClr val="tx1"/>
+                </a:solidFill>
+                <a:uFillTx/>
+              </a:endParaRPr>
+            </a:p>
+          </p:txBody>
+        </p:sp>
+        <p:sp>
+          <p:nvSpPr>
+            <p:cNvPr id="3" name="Text Box 2"/>
+            <p:cNvSpPr txBox="1"/>
+            <p:nvPr/>
+          </p:nvSpPr>
+          <p:spPr>
+            <a:xfrm>
+              <a:off x="7283" y="3708"/>
+              <a:ext cx="4957" cy="386"/>
+            </a:xfrm>
+            <a:prstGeom prst="rect">
+              <a:avLst/>
+            </a:prstGeom>
+            <a:noFill/>
+          </p:spPr>
+          <p:txBody>
+            <a:bodyPr wrap="square" rtlCol="0">
+              <a:spAutoFit/>
+            </a:bodyPr>
+            <a:p>
+              <a:pPr algn="ctr"/>
+              <a:r>
+                <a:rPr lang="pt-PT" altLang="en-US" sz="1000" b="1"/>
+                <a:t>Variáveis de projeto</a:t>
+              </a:r>
+              <a:endParaRPr lang="pt-PT" altLang="en-US" sz="1000" b="1"/>
+            </a:p>
+          </p:txBody>
+        </p:sp>
+        <p:sp>
+          <p:nvSpPr>
+            <p:cNvPr id="87" name="Text Box 86"/>
+            <p:cNvSpPr txBox="1"/>
+            <p:nvPr/>
+          </p:nvSpPr>
+          <p:spPr>
+            <a:xfrm>
+              <a:off x="7283" y="5850"/>
+              <a:ext cx="4956" cy="386"/>
+            </a:xfrm>
+            <a:prstGeom prst="rect">
+              <a:avLst/>
+            </a:prstGeom>
+            <a:noFill/>
+          </p:spPr>
+          <p:txBody>
+            <a:bodyPr wrap="square" rtlCol="0">
+              <a:spAutoFit/>
+            </a:bodyPr>
+            <a:p>
+              <a:pPr algn="ctr"/>
+              <a:r>
+                <a:rPr lang="pt-PT" altLang="en-US" sz="1000" b="1"/>
+                <a:t>Cada bit representa uma espécie</a:t>
+              </a:r>
+              <a:endParaRPr lang="pt-PT" altLang="en-US" sz="1000" b="1"/>
+            </a:p>
+          </p:txBody>
+        </p:sp>
+        <p:cxnSp>
+          <p:nvCxnSpPr>
+            <p:cNvPr id="88" name="Elbow Connector 87"/>
+            <p:cNvCxnSpPr>
+              <a:stCxn id="42" idx="2"/>
+            </p:cNvCxnSpPr>
+            <p:nvPr/>
+          </p:nvCxnSpPr>
+          <p:spPr>
+            <a:xfrm rot="5400000" flipV="1">
+              <a:off x="7483" y="5486"/>
+              <a:ext cx="406" cy="736"/>
+            </a:xfrm>
+            <a:prstGeom prst="bentConnector2">
+              <a:avLst/>
+            </a:prstGeom>
+            <a:ln w="12700">
+              <a:tailEnd type="arrow" w="med" len="med"/>
+            </a:ln>
+          </p:spPr>
+          <p:style>
+            <a:lnRef idx="1">
+              <a:schemeClr val="dk1"/>
+            </a:lnRef>
+            <a:fillRef idx="0">
+              <a:schemeClr val="dk1"/>
+            </a:fillRef>
+            <a:effectRef idx="0">
+              <a:schemeClr val="dk1"/>
+            </a:effectRef>
+            <a:fontRef idx="minor">
+              <a:schemeClr val="tx1"/>
+            </a:fontRef>
+          </p:style>
+        </p:cxnSp>
+        <p:sp>
+          <p:nvSpPr>
+            <p:cNvPr id="89" name="Right Brace 88"/>
+            <p:cNvSpPr/>
+            <p:nvPr/>
+          </p:nvSpPr>
+          <p:spPr>
+            <a:xfrm rot="16200000">
+              <a:off x="9660" y="1798"/>
+              <a:ext cx="203" cy="4795"/>
+            </a:xfrm>
+            <a:prstGeom prst="rightBrace">
+              <a:avLst>
+                <a:gd name="adj1" fmla="val 207142"/>
+                <a:gd name="adj2" fmla="val 50000"/>
+              </a:avLst>
+            </a:prstGeom>
+            <a:ln>
+              <a:solidFill>
+                <a:schemeClr val="tx1"/>
+              </a:solidFill>
+            </a:ln>
+          </p:spPr>
+          <p:style>
+            <a:lnRef idx="1">
+              <a:schemeClr val="accent1"/>
+            </a:lnRef>
+            <a:fillRef idx="0">
+              <a:schemeClr val="accent1"/>
+            </a:fillRef>
+            <a:effectRef idx="0">
+              <a:schemeClr val="accent1"/>
+            </a:effectRef>
+            <a:fontRef idx="minor">
+              <a:schemeClr val="tx1"/>
+            </a:fontRef>
+          </p:style>
+          <p:txBody>
+            <a:bodyPr rtlCol="0" anchor="ctr"/>
+            <a:p>
+              <a:pPr algn="ctr"/>
+              <a:endParaRPr lang="en-US"/>
+            </a:p>
+          </p:txBody>
+        </p:sp>
+      </p:grpSp>
+    </p:spTree>
+  </p:cSld>
+  <p:clrMapOvr>
+    <a:masterClrMapping/>
+  </p:clrMapOvr>
+</p:sld>
+</file>
+
+<file path=ppt/slides/slide4.xml><?xml version="1.0" encoding="utf-8"?>
+<p:sld xmlns:a="http://schemas.openxmlformats.org/drawingml/2006/main" xmlns:r="http://schemas.openxmlformats.org/officeDocument/2006/relationships" xmlns:p="http://schemas.openxmlformats.org/presentationml/2006/main">
+  <p:cSld>
+    <p:spTree>
+      <p:nvGrpSpPr>
+        <p:cNvPr id="1" name=""/>
+        <p:cNvGrpSpPr/>
+        <p:nvPr/>
+      </p:nvGrpSpPr>
+      <p:grpSpPr/>
+      <p:pic>
+        <p:nvPicPr>
+          <p:cNvPr id="10" name="Picture 9"/>
+          <p:cNvPicPr>
+            <a:picLocks noChangeAspect="1"/>
+          </p:cNvPicPr>
+          <p:nvPr/>
+        </p:nvPicPr>
+        <p:blipFill>
+          <a:blip r:embed="rId1"/>
+          <a:srcRect b="5928"/>
+          <a:stretch>
+            <a:fillRect/>
+          </a:stretch>
+        </p:blipFill>
+        <p:spPr>
+          <a:xfrm>
+            <a:off x="635" y="-19685"/>
+            <a:ext cx="723900" cy="6872605"/>
+          </a:xfrm>
+          <a:prstGeom prst="rect">
+            <a:avLst/>
+          </a:prstGeom>
+        </p:spPr>
+      </p:pic>
+      <p:sp>
+        <p:nvSpPr>
+          <p:cNvPr id="84" name="Google Shape;84;p2"/>
+          <p:cNvSpPr txBox="1">
+            <a:spLocks noGrp="1"/>
           </p:cNvSpPr>
           <p:nvPr>
             <p:ph type="title"/>
@@ -6489,7 +8252,7 @@
           </a:ln>
         </p:spPr>
         <p:txBody>
-          <a:bodyPr spcFirstLastPara="1" wrap="square" lIns="103150" tIns="51575" rIns="103150" bIns="51575" anchor="ctr" anchorCtr="false">
+          <a:bodyPr spcFirstLastPara="1" wrap="square" lIns="103150" tIns="51575" rIns="103150" bIns="51575" anchor="ctr" anchorCtr="0">
             <a:noAutofit/>
           </a:bodyPr>
           <a:p>
@@ -6519,8 +8282,8 @@
           <p:sp>
             <p:nvSpPr>
               <p:cNvPr id="2" name="Google Shape;84;p2"/>
-              <p:cNvSpPr txBox="true">
-                <a:spLocks noGrp="true"/>
+              <p:cNvSpPr txBox="1">
+                <a:spLocks noGrp="1"/>
               </p:cNvSpPr>
               <p:nvPr/>
             </p:nvSpPr>
@@ -6538,7 +8301,7 @@
               </a:ln>
             </p:spPr>
             <p:txBody>
-              <a:bodyPr vert="horz" wrap="square" lIns="103150" tIns="51575" rIns="103150" bIns="51575" rtlCol="0" anchor="ctr" anchorCtr="false">
+              <a:bodyPr vert="horz" wrap="square" lIns="103150" tIns="51575" rIns="103150" bIns="51575" rtlCol="0" anchor="ctr" anchorCtr="0">
                 <a:noAutofit/>
               </a:bodyPr>
               <a:lstStyle>
@@ -6610,8 +8373,8 @@
           <p:sp>
             <p:nvSpPr>
               <p:cNvPr id="2" name="Google Shape;84;p2"/>
-              <p:cNvSpPr txBox="true">
-                <a:spLocks noRot="true" noChangeAspect="true" noMove="true" noResize="true" noEditPoints="true" noAdjustHandles="true" noChangeArrowheads="true" noChangeShapeType="true" noTextEdit="true"/>
+              <p:cNvSpPr txBox="1">
+                <a:spLocks noRot="1" noChangeAspect="1" noMove="1" noResize="1" noEditPoints="1" noAdjustHandles="1" noChangeArrowheads="1" noChangeShapeType="1" noTextEdit="1"/>
               </p:cNvSpPr>
               <p:nvPr/>
             </p:nvSpPr>
@@ -6623,7 +8386,7 @@
               <a:prstGeom prst="rect">
                 <a:avLst/>
               </a:prstGeom>
-              <a:blipFill rotWithShape="true">
+              <a:blipFill rotWithShape="1">
                 <a:blip r:embed="rId2"/>
                 <a:stretch>
                   <a:fillRect/>
@@ -6653,8 +8416,8 @@
           <p:sp>
             <p:nvSpPr>
               <p:cNvPr id="3" name="Google Shape;84;p2"/>
-              <p:cNvSpPr txBox="true">
-                <a:spLocks noGrp="true"/>
+              <p:cNvSpPr txBox="1">
+                <a:spLocks noGrp="1"/>
               </p:cNvSpPr>
               <p:nvPr/>
             </p:nvSpPr>
@@ -6672,7 +8435,7 @@
               </a:ln>
             </p:spPr>
             <p:txBody>
-              <a:bodyPr vert="horz" wrap="square" lIns="103150" tIns="51575" rIns="103150" bIns="51575" rtlCol="0" anchor="ctr" anchorCtr="false">
+              <a:bodyPr vert="horz" wrap="square" lIns="103150" tIns="51575" rIns="103150" bIns="51575" rtlCol="0" anchor="ctr" anchorCtr="0">
                 <a:noAutofit/>
               </a:bodyPr>
               <a:lstStyle>
@@ -6744,8 +8507,8 @@
           <p:sp>
             <p:nvSpPr>
               <p:cNvPr id="3" name="Google Shape;84;p2"/>
-              <p:cNvSpPr txBox="true">
-                <a:spLocks noRot="true" noChangeAspect="true" noMove="true" noResize="true" noEditPoints="true" noAdjustHandles="true" noChangeArrowheads="true" noChangeShapeType="true" noTextEdit="true"/>
+              <p:cNvSpPr txBox="1">
+                <a:spLocks noRot="1" noChangeAspect="1" noMove="1" noResize="1" noEditPoints="1" noAdjustHandles="1" noChangeArrowheads="1" noChangeShapeType="1" noTextEdit="1"/>
               </p:cNvSpPr>
               <p:nvPr/>
             </p:nvSpPr>
@@ -6757,7 +8520,7 @@
               <a:prstGeom prst="rect">
                 <a:avLst/>
               </a:prstGeom>
-              <a:blipFill rotWithShape="true">
+              <a:blipFill rotWithShape="1">
                 <a:blip r:embed="rId3"/>
                 <a:stretch>
                   <a:fillRect/>
@@ -6785,8 +8548,8 @@
       <p:sp>
         <p:nvSpPr>
           <p:cNvPr id="4" name="Google Shape;84;p2"/>
-          <p:cNvSpPr txBox="true">
-            <a:spLocks noGrp="true"/>
+          <p:cNvSpPr txBox="1">
+            <a:spLocks noGrp="1"/>
           </p:cNvSpPr>
           <p:nvPr/>
         </p:nvSpPr>
@@ -6804,7 +8567,7 @@
           </a:ln>
         </p:spPr>
         <p:txBody>
-          <a:bodyPr vert="horz" wrap="square" lIns="103150" tIns="51575" rIns="103150" bIns="51575" rtlCol="0" anchor="ctr" anchorCtr="false">
+          <a:bodyPr vert="horz" wrap="square" lIns="103150" tIns="51575" rIns="103150" bIns="51575" rtlCol="0" anchor="ctr" anchorCtr="0">
             <a:noAutofit/>
           </a:bodyPr>
           <a:lstStyle>
@@ -6869,8 +8632,8 @@
       <p:sp>
         <p:nvSpPr>
           <p:cNvPr id="5" name="Google Shape;84;p2"/>
-          <p:cNvSpPr txBox="true">
-            <a:spLocks noGrp="true"/>
+          <p:cNvSpPr txBox="1">
+            <a:spLocks noGrp="1"/>
           </p:cNvSpPr>
           <p:nvPr/>
         </p:nvSpPr>
@@ -6888,7 +8651,7 @@
           </a:ln>
         </p:spPr>
         <p:txBody>
-          <a:bodyPr vert="horz" wrap="square" lIns="103150" tIns="51575" rIns="103150" bIns="51575" rtlCol="0" anchor="ctr" anchorCtr="false">
+          <a:bodyPr vert="horz" wrap="square" lIns="103150" tIns="51575" rIns="103150" bIns="51575" rtlCol="0" anchor="ctr" anchorCtr="0">
             <a:noAutofit/>
           </a:bodyPr>
           <a:lstStyle>
@@ -6967,7 +8730,7 @@
         <p:nvPicPr>
           <p:cNvPr id="6" name="Picture 5"/>
           <p:cNvPicPr>
-            <a:picLocks noChangeAspect="true"/>
+            <a:picLocks noChangeAspect="1"/>
           </p:cNvPicPr>
           <p:nvPr/>
         </p:nvPicPr>
@@ -7009,7 +8772,7 @@
         <p:nvPicPr>
           <p:cNvPr id="10" name="Picture 9"/>
           <p:cNvPicPr>
-            <a:picLocks noChangeAspect="true"/>
+            <a:picLocks noChangeAspect="1"/>
           </p:cNvPicPr>
           <p:nvPr/>
         </p:nvPicPr>
@@ -7033,8 +8796,8 @@
       <p:sp>
         <p:nvSpPr>
           <p:cNvPr id="84" name="Google Shape;84;p2"/>
-          <p:cNvSpPr txBox="true">
-            <a:spLocks noGrp="true"/>
+          <p:cNvSpPr txBox="1">
+            <a:spLocks noGrp="1"/>
           </p:cNvSpPr>
           <p:nvPr>
             <p:ph type="title"/>
@@ -7054,7 +8817,7 @@
           </a:ln>
         </p:spPr>
         <p:txBody>
-          <a:bodyPr spcFirstLastPara="1" wrap="square" lIns="103150" tIns="51575" rIns="103150" bIns="51575" anchor="ctr" anchorCtr="false">
+          <a:bodyPr spcFirstLastPara="1" wrap="square" lIns="103150" tIns="51575" rIns="103150" bIns="51575" anchor="ctr" anchorCtr="0">
             <a:noAutofit/>
           </a:bodyPr>
           <a:p>
@@ -7084,8 +8847,8 @@
           <p:sp>
             <p:nvSpPr>
               <p:cNvPr id="3" name="Google Shape;84;p2"/>
-              <p:cNvSpPr txBox="true">
-                <a:spLocks noGrp="true"/>
+              <p:cNvSpPr txBox="1">
+                <a:spLocks noGrp="1"/>
               </p:cNvSpPr>
               <p:nvPr/>
             </p:nvSpPr>
@@ -7103,7 +8866,7 @@
               </a:ln>
             </p:spPr>
             <p:txBody>
-              <a:bodyPr vert="horz" wrap="square" lIns="103150" tIns="51575" rIns="103150" bIns="51575" rtlCol="0" anchor="ctr" anchorCtr="false">
+              <a:bodyPr vert="horz" wrap="square" lIns="103150" tIns="51575" rIns="103150" bIns="51575" rtlCol="0" anchor="ctr" anchorCtr="0">
                 <a:noAutofit/>
               </a:bodyPr>
               <a:lstStyle>
@@ -7238,8 +9001,8 @@
           <p:sp>
             <p:nvSpPr>
               <p:cNvPr id="3" name="Google Shape;84;p2"/>
-              <p:cNvSpPr txBox="true">
-                <a:spLocks noRot="true" noChangeAspect="true" noMove="true" noResize="true" noEditPoints="true" noAdjustHandles="true" noChangeArrowheads="true" noChangeShapeType="true" noTextEdit="true"/>
+              <p:cNvSpPr txBox="1">
+                <a:spLocks noRot="1" noChangeAspect="1" noMove="1" noResize="1" noEditPoints="1" noAdjustHandles="1" noChangeArrowheads="1" noChangeShapeType="1" noTextEdit="1"/>
               </p:cNvSpPr>
               <p:nvPr/>
             </p:nvSpPr>
@@ -7251,7 +9014,7 @@
               <a:prstGeom prst="rect">
                 <a:avLst/>
               </a:prstGeom>
-              <a:blipFill rotWithShape="true">
+              <a:blipFill rotWithShape="1">
                 <a:blip r:embed="rId2"/>
                 <a:stretch>
                   <a:fillRect/>
@@ -7298,7 +9061,7 @@
         <p:nvPicPr>
           <p:cNvPr id="10" name="Picture 9"/>
           <p:cNvPicPr>
-            <a:picLocks noChangeAspect="true"/>
+            <a:picLocks noChangeAspect="1"/>
           </p:cNvPicPr>
           <p:nvPr/>
         </p:nvPicPr>
@@ -7322,8 +9085,8 @@
       <p:sp>
         <p:nvSpPr>
           <p:cNvPr id="84" name="Google Shape;84;p2"/>
-          <p:cNvSpPr txBox="true">
-            <a:spLocks noGrp="true"/>
+          <p:cNvSpPr txBox="1">
+            <a:spLocks noGrp="1"/>
           </p:cNvSpPr>
           <p:nvPr>
             <p:ph type="title"/>
@@ -7343,7 +9106,7 @@
           </a:ln>
         </p:spPr>
         <p:txBody>
-          <a:bodyPr spcFirstLastPara="1" wrap="square" lIns="103150" tIns="51575" rIns="103150" bIns="51575" anchor="ctr" anchorCtr="false">
+          <a:bodyPr spcFirstLastPara="1" wrap="square" lIns="103150" tIns="51575" rIns="103150" bIns="51575" anchor="ctr" anchorCtr="0">
             <a:noAutofit/>
           </a:bodyPr>
           <a:p>
@@ -7371,8 +9134,8 @@
       <p:sp>
         <p:nvSpPr>
           <p:cNvPr id="3" name="Google Shape;84;p2"/>
-          <p:cNvSpPr txBox="true">
-            <a:spLocks noGrp="true"/>
+          <p:cNvSpPr txBox="1">
+            <a:spLocks noGrp="1"/>
           </p:cNvSpPr>
           <p:nvPr/>
         </p:nvSpPr>
@@ -7390,7 +9153,7 @@
           </a:ln>
         </p:spPr>
         <p:txBody>
-          <a:bodyPr vert="horz" wrap="square" lIns="103150" tIns="51575" rIns="103150" bIns="51575" rtlCol="0" anchor="ctr" anchorCtr="false">
+          <a:bodyPr vert="horz" wrap="square" lIns="103150" tIns="51575" rIns="103150" bIns="51575" rtlCol="0" anchor="ctr" anchorCtr="0">
             <a:noAutofit/>
           </a:bodyPr>
           <a:lstStyle>
@@ -7779,8 +9542,8 @@
       <p:sp>
         <p:nvSpPr>
           <p:cNvPr id="4" name="Google Shape;84;p2"/>
-          <p:cNvSpPr txBox="true">
-            <a:spLocks noGrp="true"/>
+          <p:cNvSpPr txBox="1">
+            <a:spLocks noGrp="1"/>
           </p:cNvSpPr>
           <p:nvPr/>
         </p:nvSpPr>
@@ -7798,7 +9561,7 @@
           </a:ln>
         </p:spPr>
         <p:txBody>
-          <a:bodyPr vert="horz" wrap="square" lIns="103150" tIns="51575" rIns="103150" bIns="51575" rtlCol="0" anchor="ctr" anchorCtr="false">
+          <a:bodyPr vert="horz" wrap="square" lIns="103150" tIns="51575" rIns="103150" bIns="51575" rtlCol="0" anchor="ctr" anchorCtr="0">
             <a:noAutofit/>
           </a:bodyPr>
           <a:lstStyle>
@@ -7863,8 +9626,8 @@
       <p:sp>
         <p:nvSpPr>
           <p:cNvPr id="5" name="Google Shape;84;p2"/>
-          <p:cNvSpPr txBox="true">
-            <a:spLocks noGrp="true"/>
+          <p:cNvSpPr txBox="1">
+            <a:spLocks noGrp="1"/>
           </p:cNvSpPr>
           <p:nvPr/>
         </p:nvSpPr>
@@ -7882,7 +9645,7 @@
           </a:ln>
         </p:spPr>
         <p:txBody>
-          <a:bodyPr vert="horz" wrap="square" lIns="103150" tIns="51575" rIns="103150" bIns="51575" rtlCol="0" anchor="ctr" anchorCtr="false">
+          <a:bodyPr vert="horz" wrap="square" lIns="103150" tIns="51575" rIns="103150" bIns="51575" rtlCol="0" anchor="ctr" anchorCtr="0">
             <a:noAutofit/>
           </a:bodyPr>
           <a:lstStyle>
@@ -8280,7 +10043,7 @@
         <p:nvPicPr>
           <p:cNvPr id="10" name="Picture 9"/>
           <p:cNvPicPr>
-            <a:picLocks noChangeAspect="true"/>
+            <a:picLocks noChangeAspect="1"/>
           </p:cNvPicPr>
           <p:nvPr/>
         </p:nvPicPr>
@@ -8304,8 +10067,8 @@
       <p:sp>
         <p:nvSpPr>
           <p:cNvPr id="84" name="Google Shape;84;p2"/>
-          <p:cNvSpPr txBox="true">
-            <a:spLocks noGrp="true"/>
+          <p:cNvSpPr txBox="1">
+            <a:spLocks noGrp="1"/>
           </p:cNvSpPr>
           <p:nvPr>
             <p:ph type="title"/>
@@ -8325,7 +10088,7 @@
           </a:ln>
         </p:spPr>
         <p:txBody>
-          <a:bodyPr spcFirstLastPara="1" wrap="square" lIns="103150" tIns="51575" rIns="103150" bIns="51575" anchor="ctr" anchorCtr="false">
+          <a:bodyPr spcFirstLastPara="1" wrap="square" lIns="103150" tIns="51575" rIns="103150" bIns="51575" anchor="ctr" anchorCtr="0">
             <a:noAutofit/>
           </a:bodyPr>
           <a:p>
@@ -8436,7 +10199,7 @@
           <p:sp>
             <p:nvSpPr>
               <p:cNvPr id="38" name="Text Box 37"/>
-              <p:cNvSpPr txBox="true"/>
+              <p:cNvSpPr txBox="1"/>
               <p:nvPr/>
             </p:nvSpPr>
             <p:spPr>
@@ -8657,7 +10420,7 @@
           <p:sp>
             <p:nvSpPr>
               <p:cNvPr id="76" name="Text Box 75"/>
-              <p:cNvSpPr txBox="true"/>
+              <p:cNvSpPr txBox="1"/>
               <p:nvPr/>
             </p:nvSpPr>
             <p:spPr>
@@ -8789,7 +10552,7 @@
         <p:sp>
           <p:nvSpPr>
             <p:cNvPr id="79" name="Text Box 78"/>
-            <p:cNvSpPr txBox="true"/>
+            <p:cNvSpPr txBox="1"/>
             <p:nvPr/>
           </p:nvSpPr>
           <p:spPr>
@@ -8818,7 +10581,7 @@
         <p:sp>
           <p:nvSpPr>
             <p:cNvPr id="33" name="Text Box 32"/>
-            <p:cNvSpPr txBox="true"/>
+            <p:cNvSpPr txBox="1"/>
             <p:nvPr/>
           </p:nvSpPr>
           <p:spPr>
@@ -8848,7 +10611,7 @@
         <p:sp>
           <p:nvSpPr>
             <p:cNvPr id="87" name="Text Box 86"/>
-            <p:cNvSpPr txBox="true"/>
+            <p:cNvSpPr txBox="1"/>
             <p:nvPr/>
           </p:nvSpPr>
           <p:spPr>
@@ -8882,7 +10645,7 @@
             <p:nvPr/>
           </p:nvCxnSpPr>
           <p:spPr>
-            <a:xfrm rot="5400000" flipV="true">
+            <a:xfrm rot="5400000" flipV="1">
               <a:off x="1662" y="8865"/>
               <a:ext cx="391" cy="299"/>
             </a:xfrm>
@@ -8972,7 +10735,7 @@
           <p:sp>
             <p:nvSpPr>
               <p:cNvPr id="47" name="Text Box 46"/>
-              <p:cNvSpPr txBox="true"/>
+              <p:cNvSpPr txBox="1"/>
               <p:nvPr/>
             </p:nvSpPr>
             <p:spPr>
@@ -9085,7 +10848,7 @@
           <p:sp>
             <p:nvSpPr>
               <p:cNvPr id="73" name="Text Box 72"/>
-              <p:cNvSpPr txBox="true"/>
+              <p:cNvSpPr txBox="1"/>
               <p:nvPr/>
             </p:nvSpPr>
             <p:spPr>
@@ -9198,7 +10961,7 @@
           <p:sp>
             <p:nvSpPr>
               <p:cNvPr id="86" name="Text Box 85"/>
-              <p:cNvSpPr txBox="true"/>
+              <p:cNvSpPr txBox="1"/>
               <p:nvPr/>
             </p:nvSpPr>
             <p:spPr>
@@ -9311,7 +11074,7 @@
           <p:sp>
             <p:nvSpPr>
               <p:cNvPr id="92" name="Text Box 91"/>
-              <p:cNvSpPr txBox="true"/>
+              <p:cNvSpPr txBox="1"/>
               <p:nvPr/>
             </p:nvSpPr>
             <p:spPr>
@@ -9412,7 +11175,7 @@
         <p:nvPicPr>
           <p:cNvPr id="96" name="Picture 95"/>
           <p:cNvPicPr>
-            <a:picLocks noChangeAspect="true"/>
+            <a:picLocks noChangeAspect="1"/>
           </p:cNvPicPr>
           <p:nvPr/>
         </p:nvPicPr>
@@ -9454,7 +11217,7 @@
         <p:nvPicPr>
           <p:cNvPr id="10" name="Picture 9"/>
           <p:cNvPicPr>
-            <a:picLocks noChangeAspect="true"/>
+            <a:picLocks noChangeAspect="1"/>
           </p:cNvPicPr>
           <p:nvPr/>
         </p:nvPicPr>
@@ -9478,8 +11241,8 @@
       <p:sp>
         <p:nvSpPr>
           <p:cNvPr id="84" name="Google Shape;84;p2"/>
-          <p:cNvSpPr txBox="true">
-            <a:spLocks noGrp="true"/>
+          <p:cNvSpPr txBox="1">
+            <a:spLocks noGrp="1"/>
           </p:cNvSpPr>
           <p:nvPr>
             <p:ph type="title"/>
@@ -9499,7 +11262,7 @@
           </a:ln>
         </p:spPr>
         <p:txBody>
-          <a:bodyPr spcFirstLastPara="1" wrap="square" lIns="103150" tIns="51575" rIns="103150" bIns="51575" anchor="ctr" anchorCtr="false">
+          <a:bodyPr spcFirstLastPara="1" wrap="square" lIns="103150" tIns="51575" rIns="103150" bIns="51575" anchor="ctr" anchorCtr="0">
             <a:noAutofit/>
           </a:bodyPr>
           <a:p>
@@ -9528,7 +11291,7 @@
         <p:nvPicPr>
           <p:cNvPr id="95" name="Picture 94"/>
           <p:cNvPicPr>
-            <a:picLocks noChangeAspect="true"/>
+            <a:picLocks noChangeAspect="1"/>
           </p:cNvPicPr>
           <p:nvPr/>
         </p:nvPicPr>
@@ -9553,8 +11316,8 @@
           <p:sp>
             <p:nvSpPr>
               <p:cNvPr id="2" name="Google Shape;84;p2"/>
-              <p:cNvSpPr txBox="true">
-                <a:spLocks noGrp="true"/>
+              <p:cNvSpPr txBox="1">
+                <a:spLocks noGrp="1"/>
               </p:cNvSpPr>
               <p:nvPr/>
             </p:nvSpPr>
@@ -9572,7 +11335,7 @@
               </a:ln>
             </p:spPr>
             <p:txBody>
-              <a:bodyPr vert="horz" wrap="square" lIns="103150" tIns="51575" rIns="103150" bIns="51575" rtlCol="0" anchor="ctr" anchorCtr="false">
+              <a:bodyPr vert="horz" wrap="square" lIns="103150" tIns="51575" rIns="103150" bIns="51575" rtlCol="0" anchor="ctr" anchorCtr="0">
                 <a:noAutofit/>
               </a:bodyPr>
               <a:lstStyle>
@@ -9680,8 +11443,8 @@
           <p:sp>
             <p:nvSpPr>
               <p:cNvPr id="2" name="Google Shape;84;p2"/>
-              <p:cNvSpPr txBox="true">
-                <a:spLocks noRot="true" noChangeAspect="true" noMove="true" noResize="true" noEditPoints="true" noAdjustHandles="true" noChangeArrowheads="true" noChangeShapeType="true" noTextEdit="true"/>
+              <p:cNvSpPr txBox="1">
+                <a:spLocks noRot="1" noChangeAspect="1" noMove="1" noResize="1" noEditPoints="1" noAdjustHandles="1" noChangeArrowheads="1" noChangeShapeType="1" noTextEdit="1"/>
               </p:cNvSpPr>
               <p:nvPr/>
             </p:nvSpPr>
@@ -9693,7 +11456,7 @@
               <a:prstGeom prst="rect">
                 <a:avLst/>
               </a:prstGeom>
-              <a:blipFill rotWithShape="true">
+              <a:blipFill rotWithShape="1">
                 <a:blip r:embed="rId3"/>
                 <a:stretch>
                   <a:fillRect/>
@@ -9723,8 +11486,8 @@
           <p:sp>
             <p:nvSpPr>
               <p:cNvPr id="3" name="Google Shape;84;p2"/>
-              <p:cNvSpPr txBox="true">
-                <a:spLocks noGrp="true"/>
+              <p:cNvSpPr txBox="1">
+                <a:spLocks noGrp="1"/>
               </p:cNvSpPr>
               <p:nvPr/>
             </p:nvSpPr>
@@ -9742,7 +11505,7 @@
               </a:ln>
             </p:spPr>
             <p:txBody>
-              <a:bodyPr vert="horz" wrap="square" lIns="103150" tIns="51575" rIns="103150" bIns="51575" rtlCol="0" anchor="ctr" anchorCtr="false">
+              <a:bodyPr vert="horz" wrap="square" lIns="103150" tIns="51575" rIns="103150" bIns="51575" rtlCol="0" anchor="ctr" anchorCtr="0">
                 <a:noAutofit/>
               </a:bodyPr>
               <a:lstStyle>
@@ -9947,8 +11710,8 @@
           <p:sp>
             <p:nvSpPr>
               <p:cNvPr id="3" name="Google Shape;84;p2"/>
-              <p:cNvSpPr txBox="true">
-                <a:spLocks noRot="true" noChangeAspect="true" noMove="true" noResize="true" noEditPoints="true" noAdjustHandles="true" noChangeArrowheads="true" noChangeShapeType="true" noTextEdit="true"/>
+              <p:cNvSpPr txBox="1">
+                <a:spLocks noRot="1" noChangeAspect="1" noMove="1" noResize="1" noEditPoints="1" noAdjustHandles="1" noChangeArrowheads="1" noChangeShapeType="1" noTextEdit="1"/>
               </p:cNvSpPr>
               <p:nvPr/>
             </p:nvSpPr>
@@ -9960,7 +11723,7 @@
               <a:prstGeom prst="rect">
                 <a:avLst/>
               </a:prstGeom>
-              <a:blipFill rotWithShape="true">
+              <a:blipFill rotWithShape="1">
                 <a:blip r:embed="rId4"/>
                 <a:stretch>
                   <a:fillRect/>
@@ -9988,8 +11751,8 @@
       <p:sp>
         <p:nvSpPr>
           <p:cNvPr id="4" name="Google Shape;84;p2"/>
-          <p:cNvSpPr txBox="true">
-            <a:spLocks noGrp="true"/>
+          <p:cNvSpPr txBox="1">
+            <a:spLocks noGrp="1"/>
           </p:cNvSpPr>
           <p:nvPr/>
         </p:nvSpPr>
@@ -10007,7 +11770,7 @@
           </a:ln>
         </p:spPr>
         <p:txBody>
-          <a:bodyPr vert="horz" wrap="square" lIns="103150" tIns="51575" rIns="103150" bIns="51575" rtlCol="0" anchor="ctr" anchorCtr="false">
+          <a:bodyPr vert="horz" wrap="square" lIns="103150" tIns="51575" rIns="103150" bIns="51575" rtlCol="0" anchor="ctr" anchorCtr="0">
             <a:noAutofit/>
           </a:bodyPr>
           <a:lstStyle>
@@ -10085,8 +11848,8 @@
       <p:sp>
         <p:nvSpPr>
           <p:cNvPr id="5" name="Google Shape;84;p2"/>
-          <p:cNvSpPr txBox="true">
-            <a:spLocks noGrp="true"/>
+          <p:cNvSpPr txBox="1">
+            <a:spLocks noGrp="1"/>
           </p:cNvSpPr>
           <p:nvPr/>
         </p:nvSpPr>
@@ -10104,7 +11867,7 @@
           </a:ln>
         </p:spPr>
         <p:txBody>
-          <a:bodyPr vert="horz" wrap="square" lIns="103150" tIns="51575" rIns="103150" bIns="51575" rtlCol="0" anchor="ctr" anchorCtr="false">
+          <a:bodyPr vert="horz" wrap="square" lIns="103150" tIns="51575" rIns="103150" bIns="51575" rtlCol="0" anchor="ctr" anchorCtr="0">
             <a:noAutofit/>
           </a:bodyPr>
           <a:lstStyle>
@@ -10201,7 +11964,7 @@
         <p:nvPicPr>
           <p:cNvPr id="10" name="Picture 9"/>
           <p:cNvPicPr>
-            <a:picLocks noChangeAspect="true"/>
+            <a:picLocks noChangeAspect="1"/>
           </p:cNvPicPr>
           <p:nvPr/>
         </p:nvPicPr>
@@ -10225,8 +11988,8 @@
       <p:sp>
         <p:nvSpPr>
           <p:cNvPr id="84" name="Google Shape;84;p2"/>
-          <p:cNvSpPr txBox="true">
-            <a:spLocks noGrp="true"/>
+          <p:cNvSpPr txBox="1">
+            <a:spLocks noGrp="1"/>
           </p:cNvSpPr>
           <p:nvPr>
             <p:ph type="title"/>
@@ -10246,7 +12009,7 @@
           </a:ln>
         </p:spPr>
         <p:txBody>
-          <a:bodyPr spcFirstLastPara="1" wrap="square" lIns="103150" tIns="51575" rIns="103150" bIns="51575" anchor="ctr" anchorCtr="false">
+          <a:bodyPr spcFirstLastPara="1" wrap="square" lIns="103150" tIns="51575" rIns="103150" bIns="51575" anchor="ctr" anchorCtr="0">
             <a:noAutofit/>
           </a:bodyPr>
           <a:p>
@@ -10277,8 +12040,8 @@
           <p:sp>
             <p:nvSpPr>
               <p:cNvPr id="3" name="Google Shape;84;p2"/>
-              <p:cNvSpPr txBox="true">
-                <a:spLocks noGrp="true"/>
+              <p:cNvSpPr txBox="1">
+                <a:spLocks noGrp="1"/>
               </p:cNvSpPr>
               <p:nvPr/>
             </p:nvSpPr>
@@ -10296,7 +12059,7 @@
               </a:ln>
             </p:spPr>
             <p:txBody>
-              <a:bodyPr vert="horz" wrap="square" lIns="103150" tIns="51575" rIns="103150" bIns="51575" rtlCol="0" anchor="ctr" anchorCtr="false">
+              <a:bodyPr vert="horz" wrap="square" lIns="103150" tIns="51575" rIns="103150" bIns="51575" rtlCol="0" anchor="ctr" anchorCtr="0">
                 <a:noAutofit/>
               </a:bodyPr>
               <a:lstStyle>
@@ -10813,8 +12576,8 @@
           <p:sp>
             <p:nvSpPr>
               <p:cNvPr id="3" name="Google Shape;84;p2"/>
-              <p:cNvSpPr txBox="true">
-                <a:spLocks noRot="true" noChangeAspect="true" noMove="true" noResize="true" noEditPoints="true" noAdjustHandles="true" noChangeArrowheads="true" noChangeShapeType="true" noTextEdit="true"/>
+              <p:cNvSpPr txBox="1">
+                <a:spLocks noRot="1" noChangeAspect="1" noMove="1" noResize="1" noEditPoints="1" noAdjustHandles="1" noChangeArrowheads="1" noChangeShapeType="1" noTextEdit="1"/>
               </p:cNvSpPr>
               <p:nvPr/>
             </p:nvSpPr>
@@ -10826,7 +12589,7 @@
               <a:prstGeom prst="rect">
                 <a:avLst/>
               </a:prstGeom>
-              <a:blipFill rotWithShape="true">
+              <a:blipFill rotWithShape="1">
                 <a:blip r:embed="rId2"/>
                 <a:stretch>
                   <a:fillRect/>
@@ -10977,7 +12740,7 @@
         <a:solidFill>
           <a:schemeClr val="phClr"/>
         </a:solidFill>
-        <a:gradFill rotWithShape="true">
+        <a:gradFill rotWithShape="1">
           <a:gsLst>
             <a:gs pos="0">
               <a:schemeClr val="phClr">
@@ -11001,9 +12764,9 @@
               </a:schemeClr>
             </a:gs>
           </a:gsLst>
-          <a:lin ang="5400000" scaled="false"/>
+          <a:lin ang="5400000" scaled="0"/>
         </a:gradFill>
-        <a:gradFill rotWithShape="true">
+        <a:gradFill rotWithShape="1">
           <a:gsLst>
             <a:gs pos="0">
               <a:schemeClr val="phClr">
@@ -11027,7 +12790,7 @@
               </a:schemeClr>
             </a:gs>
           </a:gsLst>
-          <a:lin ang="5400000" scaled="false"/>
+          <a:lin ang="5400000" scaled="0"/>
         </a:gradFill>
       </a:fillStyleLst>
       <a:lnStyleLst>
@@ -11080,7 +12843,7 @@
             <a:satMod val="170000"/>
           </a:schemeClr>
         </a:solidFill>
-        <a:gradFill rotWithShape="true">
+        <a:gradFill rotWithShape="1">
           <a:gsLst>
             <a:gs pos="0">
               <a:schemeClr val="phClr">
@@ -11105,7 +12868,7 @@
               </a:schemeClr>
             </a:gs>
           </a:gsLst>
-          <a:lin ang="5400000" scaled="false"/>
+          <a:lin ang="5400000" scaled="0"/>
         </a:gradFill>
       </a:bgFillStyleLst>
     </a:fmtScheme>
@@ -11236,7 +12999,7 @@
         <a:solidFill>
           <a:schemeClr val="phClr"/>
         </a:solidFill>
-        <a:gradFill rotWithShape="true">
+        <a:gradFill rotWithShape="1">
           <a:gsLst>
             <a:gs pos="0">
               <a:schemeClr val="phClr">
@@ -11260,9 +13023,9 @@
               </a:schemeClr>
             </a:gs>
           </a:gsLst>
-          <a:lin ang="5400000" scaled="false"/>
+          <a:lin ang="5400000" scaled="0"/>
         </a:gradFill>
-        <a:gradFill rotWithShape="true">
+        <a:gradFill rotWithShape="1">
           <a:gsLst>
             <a:gs pos="0">
               <a:schemeClr val="phClr">
@@ -11286,7 +13049,7 @@
               </a:schemeClr>
             </a:gs>
           </a:gsLst>
-          <a:lin ang="5400000" scaled="false"/>
+          <a:lin ang="5400000" scaled="0"/>
         </a:gradFill>
       </a:fillStyleLst>
       <a:lnStyleLst>
@@ -11339,7 +13102,7 @@
             <a:satMod val="170000"/>
           </a:schemeClr>
         </a:solidFill>
-        <a:gradFill rotWithShape="true">
+        <a:gradFill rotWithShape="1">
           <a:gsLst>
             <a:gs pos="0">
               <a:schemeClr val="phClr">
@@ -11364,7 +13127,7 @@
               </a:schemeClr>
             </a:gs>
           </a:gsLst>
-          <a:lin ang="5400000" scaled="false"/>
+          <a:lin ang="5400000" scaled="0"/>
         </a:gradFill>
       </a:bgFillStyleLst>
     </a:fmtScheme>
@@ -11495,7 +13258,7 @@
         <a:solidFill>
           <a:schemeClr val="phClr"/>
         </a:solidFill>
-        <a:gradFill rotWithShape="true">
+        <a:gradFill rotWithShape="1">
           <a:gsLst>
             <a:gs pos="0">
               <a:schemeClr val="phClr">
@@ -11519,9 +13282,9 @@
               </a:schemeClr>
             </a:gs>
           </a:gsLst>
-          <a:lin ang="5400000" scaled="false"/>
+          <a:lin ang="5400000" scaled="0"/>
         </a:gradFill>
-        <a:gradFill rotWithShape="true">
+        <a:gradFill rotWithShape="1">
           <a:gsLst>
             <a:gs pos="0">
               <a:schemeClr val="phClr">
@@ -11545,7 +13308,7 @@
               </a:schemeClr>
             </a:gs>
           </a:gsLst>
-          <a:lin ang="5400000" scaled="false"/>
+          <a:lin ang="5400000" scaled="0"/>
         </a:gradFill>
       </a:fillStyleLst>
       <a:lnStyleLst>
@@ -11598,7 +13361,7 @@
             <a:satMod val="170000"/>
           </a:schemeClr>
         </a:solidFill>
-        <a:gradFill rotWithShape="true">
+        <a:gradFill rotWithShape="1">
           <a:gsLst>
             <a:gs pos="0">
               <a:schemeClr val="phClr">
@@ -11623,7 +13386,7 @@
               </a:schemeClr>
             </a:gs>
           </a:gsLst>
-          <a:lin ang="5400000" scaled="false"/>
+          <a:lin ang="5400000" scaled="0"/>
         </a:gradFill>
       </a:bgFillStyleLst>
     </a:fmtScheme>

</xml_diff>